<commit_message>
Edits and updates to slide deck
</commit_message>
<xml_diff>
--- a/LectureSlides/10_ModelsInHighDimensions.pptx
+++ b/LectureSlides/10_ModelsInHighDimensions.pptx
@@ -11,7 +11,7 @@
     <p:sldId id="258" r:id="rId5"/>
     <p:sldId id="259" r:id="rId6"/>
     <p:sldId id="260" r:id="rId7"/>
-    <p:sldId id="261" r:id="rId8"/>
+    <p:sldId id="340" r:id="rId8"/>
     <p:sldId id="262" r:id="rId9"/>
     <p:sldId id="263" r:id="rId10"/>
     <p:sldId id="264" r:id="rId11"/>
@@ -3355,8 +3355,8 @@
           </a:p>
         </p:txBody>
       </p:sp>
-      <mc:AlternateContent xmlns:mc="http://schemas.openxmlformats.org/markup-compatibility/2006" xmlns:a14="http://schemas.microsoft.com/office/drawing/2010/main">
-        <mc:Choice Requires="a14">
+      <mc:AlternateContent xmlns:mc="http://schemas.openxmlformats.org/markup-compatibility/2006">
+        <mc:Choice xmlns:a14="http://schemas.microsoft.com/office/drawing/2010/main" Requires="a14">
           <p:sp>
             <p:nvSpPr>
               <p:cNvPr id="3" name="Content Placeholder 2"/>
@@ -3370,7 +3370,7 @@
             <p:spPr/>
             <p:txBody>
               <a:bodyPr>
-                <a:normAutofit fontScale="62500" lnSpcReduction="20000"/>
+                <a:normAutofit fontScale="85000" lnSpcReduction="20000"/>
               </a:bodyPr>
               <a:lstStyle/>
               <a:p>
@@ -3378,56 +3378,69 @@
                   <a:buNone/>
                 </a:pPr>
                 <a:r>
-                  <a:rPr b="1"/>
+                  <a:rPr b="1" dirty="0"/>
                   <a:t>Idea!:</a:t>
                 </a:r>
                 <a:r>
+                  <a:rPr dirty="0"/>
                   <a:t> Try systematically pruning the model using some metric</a:t>
                 </a:r>
               </a:p>
               <a:p>
                 <a:pPr lvl="0"/>
                 <a:r>
-                  <a:t>Leads to the the </a:t>
-                </a:r>
-                <a:r>
-                  <a:rPr b="1"/>
+                  <a:rPr dirty="0"/>
+                  <a:t>Leads to the </a:t>
+                </a:r>
+                <a:r>
+                  <a:rPr b="1" dirty="0"/>
                   <a:t>step-wise regression algorithm</a:t>
                 </a:r>
               </a:p>
               <a:p>
                 <a:pPr lvl="1"/>
                 <a:r>
-                  <a:t>Forward step-wise regression adds most explanatory variable one at a time</a:t>
-                </a:r>
-                <a:br/>
-                <a:endParaRPr/>
+                  <a:rPr b="1" dirty="0"/>
+                  <a:t>Forward step-wise regression</a:t>
+                </a:r>
+                <a:r>
+                  <a:rPr dirty="0"/>
+                  <a:t> adds most explanatory variable one at a time</a:t>
+                </a:r>
               </a:p>
               <a:p>
                 <a:pPr lvl="1"/>
                 <a:r>
-                  <a:t>Backward step-wise regression removes least explanatory variable one at a time</a:t>
-                </a:r>
-                <a:br/>
-                <a:endParaRPr/>
+                  <a:rPr b="1" dirty="0"/>
+                  <a:t>Backward step-wise regression </a:t>
+                </a:r>
+                <a:r>
+                  <a:rPr dirty="0"/>
+                  <a:t>removes least explanatory variable one at a time</a:t>
+                </a:r>
               </a:p>
               <a:p>
                 <a:pPr lvl="1"/>
                 <a:r>
-                  <a:t>Can go both directions - see the R documentation</a:t>
-                </a:r>
-                <a:br/>
-                <a:endParaRPr/>
+                  <a:rPr b="1" dirty="0"/>
+                  <a:t>Can go both directions </a:t>
+                </a:r>
+                <a:r>
+                  <a:rPr dirty="0"/>
+                  <a:t>- see the R documentation</a:t>
+                </a:r>
               </a:p>
               <a:p>
                 <a:pPr lvl="1"/>
                 <a:r>
+                  <a:rPr dirty="0"/>
                   <a:t>Hard to find a good metric</a:t>
                 </a:r>
               </a:p>
               <a:p>
                 <a:pPr lvl="0"/>
                 <a:r>
+                  <a:rPr dirty="0"/>
                   <a:t>But, making multiple hypothesis tests is a fraught undertaking</a:t>
                 </a:r>
               </a:p>
@@ -3463,21 +3476,26 @@
                   </m:oMath>
                 </a14:m>
                 <a:r>
+                  <a:rPr dirty="0"/>
                   <a:t> is null or insignificant predictor</a:t>
                 </a:r>
               </a:p>
               <a:p>
                 <a:pPr lvl="1"/>
                 <a:r>
+                  <a:rPr dirty="0"/>
                   <a:t>High probability of Type 1 or Type 2 error</a:t>
                 </a:r>
-                <a:br/>
-                <a:endParaRPr/>
               </a:p>
               <a:p>
                 <a:pPr lvl="1"/>
                 <a:r>
-                  <a:t>Type 1 error, fail to accept </a:t>
+                  <a:rPr b="1" dirty="0"/>
+                  <a:t>Type 1 error</a:t>
+                </a:r>
+                <a:r>
+                  <a:rPr dirty="0"/>
+                  <a:t>, fail to accept </a:t>
                 </a:r>
                 <a14:m>
                   <m:oMath xmlns:m="http://schemas.openxmlformats.org/officeDocument/2006/math">
@@ -3509,6 +3527,7 @@
                   </m:oMath>
                 </a14:m>
                 <a:r>
+                  <a:rPr dirty="0"/>
                   <a:t>, </a:t>
                 </a:r>
                 <a14:m>
@@ -3522,15 +3541,19 @@
                   </m:oMath>
                 </a14:m>
                 <a:r>
+                  <a:rPr dirty="0"/>
                   <a:t> include insignificant predictor</a:t>
                 </a:r>
-                <a:br/>
-                <a:endParaRPr/>
               </a:p>
               <a:p>
                 <a:pPr lvl="1"/>
                 <a:r>
-                  <a:t>Type 2 error, fail to reject </a:t>
+                  <a:rPr b="1" dirty="0"/>
+                  <a:t>Type 2 error</a:t>
+                </a:r>
+                <a:r>
+                  <a:rPr dirty="0"/>
+                  <a:t>, fail to reject </a:t>
                 </a:r>
                 <a14:m>
                   <m:oMath xmlns:m="http://schemas.openxmlformats.org/officeDocument/2006/math">
@@ -3562,6 +3585,7 @@
                   </m:oMath>
                 </a14:m>
                 <a:r>
+                  <a:rPr dirty="0"/>
                   <a:t>, </a:t>
                 </a:r>
                 <a14:m>
@@ -3575,13 +3599,14 @@
                   </m:oMath>
                 </a14:m>
                 <a:r>
+                  <a:rPr dirty="0"/>
                   <a:t> drop significant predictor</a:t>
                 </a:r>
               </a:p>
             </p:txBody>
           </p:sp>
         </mc:Choice>
-        <mc:Fallback xmlns="">
+        <mc:Fallback>
           <p:sp>
             <p:nvSpPr>
               <p:cNvPr id="3" name="Content Placeholder 2"/>
@@ -3596,7 +3621,7 @@
               <a:blipFill>
                 <a:blip r:embed="rId2"/>
                 <a:stretch>
-                  <a:fillRect l="-296" t="-1436"/>
+                  <a:fillRect l="-741" t="-2693" b="-1975"/>
                 </a:stretch>
               </a:blipFill>
             </p:spPr>
@@ -5504,7 +5529,13 @@
                           <a:rPr>
                             <a:latin typeface="Cambria Math" panose="02040503050406030204" pitchFamily="18" charset="0"/>
                           </a:rPr>
-                          <m:t>−1</m:t>
+                          <m:t>−</m:t>
+                        </m:r>
+                        <m:r>
+                          <a:rPr>
+                            <a:latin typeface="Cambria Math" panose="02040503050406030204" pitchFamily="18" charset="0"/>
+                          </a:rPr>
+                          <m:t>1</m:t>
                         </m:r>
                       </m:sup>
                     </m:sSup>
@@ -5558,7 +5589,13 @@
                           <a:rPr>
                             <a:latin typeface="Cambria Math" panose="02040503050406030204" pitchFamily="18" charset="0"/>
                           </a:rPr>
-                          <m:t>−1</m:t>
+                          <m:t>−</m:t>
+                        </m:r>
+                        <m:r>
+                          <a:rPr>
+                            <a:latin typeface="Cambria Math" panose="02040503050406030204" pitchFamily="18" charset="0"/>
+                          </a:rPr>
+                          <m:t>1</m:t>
                         </m:r>
                       </m:sup>
                     </m:sSup>
@@ -5819,7 +5856,13 @@
                             <a:rPr>
                               <a:latin typeface="Cambria Math" panose="02040503050406030204" pitchFamily="18" charset="0"/>
                             </a:rPr>
-                            <m:t>−1</m:t>
+                            <m:t>−</m:t>
+                          </m:r>
+                          <m:r>
+                            <a:rPr>
+                              <a:latin typeface="Cambria Math" panose="02040503050406030204" pitchFamily="18" charset="0"/>
+                            </a:rPr>
+                            <m:t>1</m:t>
                           </m:r>
                         </m:sup>
                       </m:sSup>
@@ -5966,7 +6009,13 @@
                             <a:rPr>
                               <a:latin typeface="Cambria Math" panose="02040503050406030204" pitchFamily="18" charset="0"/>
                             </a:rPr>
-                            <m:t>−1</m:t>
+                            <m:t>−</m:t>
+                          </m:r>
+                          <m:r>
+                            <a:rPr>
+                              <a:latin typeface="Cambria Math" panose="02040503050406030204" pitchFamily="18" charset="0"/>
+                            </a:rPr>
+                            <m:t>1</m:t>
                           </m:r>
                         </m:sup>
                       </m:sSup>
@@ -6092,8 +6141,8 @@
           </a:p>
         </p:txBody>
       </p:sp>
-      <mc:AlternateContent xmlns:mc="http://schemas.openxmlformats.org/markup-compatibility/2006">
-        <mc:Choice xmlns:a14="http://schemas.microsoft.com/office/drawing/2010/main" Requires="a14">
+      <mc:AlternateContent xmlns:mc="http://schemas.openxmlformats.org/markup-compatibility/2006" xmlns:a14="http://schemas.microsoft.com/office/drawing/2010/main">
+        <mc:Choice Requires="a14">
           <p:sp>
             <p:nvSpPr>
               <p:cNvPr id="3" name="Content Placeholder 2"/>
@@ -6530,7 +6579,7 @@
             </p:txBody>
           </p:sp>
         </mc:Choice>
-        <mc:Fallback>
+        <mc:Fallback xmlns="">
           <p:sp>
             <p:nvSpPr>
               <p:cNvPr id="3" name="Content Placeholder 2"/>
@@ -9534,8 +9583,8 @@
           </a:p>
         </p:txBody>
       </p:sp>
-      <mc:AlternateContent xmlns:mc="http://schemas.openxmlformats.org/markup-compatibility/2006">
-        <mc:Choice xmlns:a14="http://schemas.microsoft.com/office/drawing/2010/main" Requires="a14">
+      <mc:AlternateContent xmlns:mc="http://schemas.openxmlformats.org/markup-compatibility/2006" xmlns:a14="http://schemas.microsoft.com/office/drawing/2010/main">
+        <mc:Choice Requires="a14">
           <p:sp>
             <p:nvSpPr>
               <p:cNvPr id="3" name="Content Placeholder 2"/>
@@ -9737,7 +9786,25 @@
                                   <a:rPr>
                                     <a:latin typeface="Cambria Math" panose="02040503050406030204" pitchFamily="18" charset="0"/>
                                   </a:rPr>
-                                  <m:t>,0,…,0</m:t>
+                                  <m:t>,</m:t>
+                                </m:r>
+                                <m:r>
+                                  <a:rPr>
+                                    <a:latin typeface="Cambria Math" panose="02040503050406030204" pitchFamily="18" charset="0"/>
+                                  </a:rPr>
+                                  <m:t>0</m:t>
+                                </m:r>
+                                <m:r>
+                                  <a:rPr>
+                                    <a:latin typeface="Cambria Math" panose="02040503050406030204" pitchFamily="18" charset="0"/>
+                                  </a:rPr>
+                                  <m:t>,…,</m:t>
+                                </m:r>
+                                <m:r>
+                                  <a:rPr>
+                                    <a:latin typeface="Cambria Math" panose="02040503050406030204" pitchFamily="18" charset="0"/>
+                                  </a:rPr>
+                                  <m:t>0</m:t>
                                 </m:r>
                               </m:e>
                             </m:mr>
@@ -9747,7 +9814,13 @@
                                   <a:rPr>
                                     <a:latin typeface="Cambria Math" panose="02040503050406030204" pitchFamily="18" charset="0"/>
                                   </a:rPr>
-                                  <m:t>0,</m:t>
+                                  <m:t>0</m:t>
+                                </m:r>
+                                <m:r>
+                                  <a:rPr>
+                                    <a:latin typeface="Cambria Math" panose="02040503050406030204" pitchFamily="18" charset="0"/>
+                                  </a:rPr>
+                                  <m:t>,</m:t>
                                 </m:r>
                                 <m:sSub>
                                   <m:sSubPr>
@@ -9809,7 +9882,13 @@
                                   <a:rPr>
                                     <a:latin typeface="Cambria Math" panose="02040503050406030204" pitchFamily="18" charset="0"/>
                                   </a:rPr>
-                                  <m:t>,…,0</m:t>
+                                  <m:t>,…,</m:t>
+                                </m:r>
+                                <m:r>
+                                  <a:rPr>
+                                    <a:latin typeface="Cambria Math" panose="02040503050406030204" pitchFamily="18" charset="0"/>
+                                  </a:rPr>
+                                  <m:t>0</m:t>
                                 </m:r>
                               </m:e>
                             </m:mr>
@@ -9829,7 +9908,25 @@
                                   <a:rPr>
                                     <a:latin typeface="Cambria Math" panose="02040503050406030204" pitchFamily="18" charset="0"/>
                                   </a:rPr>
-                                  <m:t>0,0,…,</m:t>
+                                  <m:t>0</m:t>
+                                </m:r>
+                                <m:r>
+                                  <a:rPr>
+                                    <a:latin typeface="Cambria Math" panose="02040503050406030204" pitchFamily="18" charset="0"/>
+                                  </a:rPr>
+                                  <m:t>,</m:t>
+                                </m:r>
+                                <m:r>
+                                  <a:rPr>
+                                    <a:latin typeface="Cambria Math" panose="02040503050406030204" pitchFamily="18" charset="0"/>
+                                  </a:rPr>
+                                  <m:t>0</m:t>
+                                </m:r>
+                                <m:r>
+                                  <a:rPr>
+                                    <a:latin typeface="Cambria Math" panose="02040503050406030204" pitchFamily="18" charset="0"/>
+                                  </a:rPr>
+                                  <m:t>,…,</m:t>
                                 </m:r>
                                 <m:sSub>
                                   <m:sSubPr>
@@ -9925,7 +10022,7 @@
             </p:txBody>
           </p:sp>
         </mc:Choice>
-        <mc:Fallback>
+        <mc:Fallback xmlns="">
           <p:sp>
             <p:nvSpPr>
               <p:cNvPr id="3" name="Content Placeholder 2"/>
@@ -11221,8 +11318,8 @@
           </a:p>
         </p:txBody>
       </p:sp>
-      <mc:AlternateContent xmlns:mc="http://schemas.openxmlformats.org/markup-compatibility/2006">
-        <mc:Choice xmlns:a14="http://schemas.microsoft.com/office/drawing/2010/main" Requires="a14">
+      <mc:AlternateContent xmlns:mc="http://schemas.openxmlformats.org/markup-compatibility/2006" xmlns:a14="http://schemas.microsoft.com/office/drawing/2010/main">
+        <mc:Choice Requires="a14">
           <p:sp>
             <p:nvSpPr>
               <p:cNvPr id="3" name="Content Placeholder 2"/>
@@ -11302,7 +11399,7 @@
             </p:txBody>
           </p:sp>
         </mc:Choice>
-        <mc:Fallback>
+        <mc:Fallback xmlns="">
           <p:sp>
             <p:nvSpPr>
               <p:cNvPr id="3" name="Content Placeholder 2"/>
@@ -15028,8 +15125,8 @@
           </a:p>
         </p:txBody>
       </p:sp>
-      <mc:AlternateContent xmlns:mc="http://schemas.openxmlformats.org/markup-compatibility/2006">
-        <mc:Choice xmlns:a14="http://schemas.microsoft.com/office/drawing/2010/main" Requires="a14">
+      <mc:AlternateContent xmlns:mc="http://schemas.openxmlformats.org/markup-compatibility/2006" xmlns:a14="http://schemas.microsoft.com/office/drawing/2010/main">
+        <mc:Choice Requires="a14">
           <p:sp>
             <p:nvSpPr>
               <p:cNvPr id="3" name="Content Placeholder 2"/>
@@ -15664,7 +15761,7 @@
             </p:txBody>
           </p:sp>
         </mc:Choice>
-        <mc:Fallback>
+        <mc:Fallback xmlns="">
           <p:sp>
             <p:nvSpPr>
               <p:cNvPr id="3" name="Content Placeholder 2"/>
@@ -15883,468 +15980,569 @@
               <a:buNone/>
             </a:pPr>
             <a:r>
+              <a:rPr dirty="0"/>
               <a:t>Dealing with Overfit Models</a:t>
             </a:r>
           </a:p>
         </p:txBody>
       </p:sp>
-      <p:sp>
-        <p:nvSpPr>
-          <p:cNvPr id="3" name="Content Placeholder 2"/>
-          <p:cNvSpPr>
-            <a:spLocks noGrp="1"/>
-          </p:cNvSpPr>
-          <p:nvPr>
-            <p:ph idx="1"/>
-          </p:nvPr>
-        </p:nvSpPr>
-        <p:spPr/>
-        <p:txBody>
-          <a:bodyPr>
-            <a:normAutofit fontScale="25000" lnSpcReduction="20000"/>
-          </a:bodyPr>
-          <a:lstStyle/>
-          <a:p>
-            <a:pPr marL="0" lvl="0" indent="0">
-              <a:buNone/>
-            </a:pPr>
-            <a:r>
-              <a:rPr dirty="0"/>
-              <a:t>Example: We suspect that the terms, </a:t>
-            </a:r>
-            <a:r>
-              <a:rPr dirty="0" err="1"/>
-              <a:t>ses</a:t>
-            </a:r>
-            <a:r>
-              <a:rPr dirty="0"/>
-              <a:t> and prog are significant in predicting social science test scores:</a:t>
-            </a:r>
-          </a:p>
-          <a:p>
-            <a:pPr lvl="0" indent="0">
-              <a:buNone/>
-            </a:pPr>
-            <a:r>
-              <a:rPr dirty="0">
-                <a:latin typeface="Courier"/>
-              </a:rPr>
-              <a:t>formula </a:t>
-            </a:r>
-            <a:r>
-              <a:rPr dirty="0">
-                <a:solidFill>
-                  <a:srgbClr val="666666"/>
-                </a:solidFill>
-                <a:latin typeface="Courier"/>
-              </a:rPr>
-              <a:t>=</a:t>
-            </a:r>
-            <a:r>
-              <a:rPr dirty="0">
-                <a:latin typeface="Courier"/>
-              </a:rPr>
-              <a:t> </a:t>
-            </a:r>
-            <a:r>
-              <a:rPr dirty="0">
-                <a:solidFill>
-                  <a:srgbClr val="4070A0"/>
-                </a:solidFill>
-                <a:latin typeface="Courier"/>
-              </a:rPr>
-              <a:t>'</a:t>
-            </a:r>
-            <a:r>
-              <a:rPr dirty="0" err="1">
-                <a:solidFill>
-                  <a:srgbClr val="4070A0"/>
-                </a:solidFill>
-                <a:latin typeface="Courier"/>
-              </a:rPr>
-              <a:t>socst</a:t>
-            </a:r>
-            <a:r>
-              <a:rPr dirty="0">
-                <a:solidFill>
-                  <a:srgbClr val="4070A0"/>
-                </a:solidFill>
-                <a:latin typeface="Courier"/>
-              </a:rPr>
-              <a:t> ~ C(</a:t>
-            </a:r>
-            <a:r>
-              <a:rPr dirty="0" err="1">
-                <a:solidFill>
-                  <a:srgbClr val="4070A0"/>
-                </a:solidFill>
-                <a:latin typeface="Courier"/>
-              </a:rPr>
-              <a:t>ses</a:t>
-            </a:r>
-            <a:r>
-              <a:rPr dirty="0">
-                <a:solidFill>
-                  <a:srgbClr val="4070A0"/>
-                </a:solidFill>
-                <a:latin typeface="Courier"/>
-              </a:rPr>
-              <a:t>)*C(prog)'</a:t>
-            </a:r>
-            <a:br>
-              <a:rPr dirty="0"/>
-            </a:br>
-            <a:r>
-              <a:rPr i="1" dirty="0">
-                <a:solidFill>
-                  <a:srgbClr val="60A0B0"/>
-                </a:solidFill>
-                <a:latin typeface="Courier"/>
-              </a:rPr>
-              <a:t>#linear_model = </a:t>
-            </a:r>
-            <a:r>
-              <a:rPr i="1" dirty="0" err="1">
-                <a:solidFill>
-                  <a:srgbClr val="60A0B0"/>
-                </a:solidFill>
-                <a:latin typeface="Courier"/>
-              </a:rPr>
-              <a:t>smf.ols</a:t>
-            </a:r>
-            <a:r>
-              <a:rPr i="1" dirty="0">
-                <a:solidFill>
-                  <a:srgbClr val="60A0B0"/>
-                </a:solidFill>
-                <a:latin typeface="Courier"/>
-              </a:rPr>
-              <a:t>("</a:t>
-            </a:r>
-            <a:r>
-              <a:rPr i="1" dirty="0" err="1">
-                <a:solidFill>
-                  <a:srgbClr val="60A0B0"/>
-                </a:solidFill>
-                <a:latin typeface="Courier"/>
-              </a:rPr>
-              <a:t>socst</a:t>
-            </a:r>
-            <a:r>
-              <a:rPr i="1" dirty="0">
-                <a:solidFill>
-                  <a:srgbClr val="60A0B0"/>
-                </a:solidFill>
-                <a:latin typeface="Courier"/>
-              </a:rPr>
-              <a:t> ~ C(</a:t>
-            </a:r>
-            <a:r>
-              <a:rPr i="1" dirty="0" err="1">
-                <a:solidFill>
-                  <a:srgbClr val="60A0B0"/>
-                </a:solidFill>
-                <a:latin typeface="Courier"/>
-              </a:rPr>
-              <a:t>ses</a:t>
-            </a:r>
-            <a:r>
-              <a:rPr i="1" dirty="0">
-                <a:solidFill>
-                  <a:srgbClr val="60A0B0"/>
-                </a:solidFill>
-                <a:latin typeface="Courier"/>
-              </a:rPr>
-              <a:t>)*C(prog)", data=</a:t>
-            </a:r>
-            <a:r>
-              <a:rPr i="1" dirty="0" err="1">
-                <a:solidFill>
-                  <a:srgbClr val="60A0B0"/>
-                </a:solidFill>
-                <a:latin typeface="Courier"/>
-              </a:rPr>
-              <a:t>test_scores_train</a:t>
-            </a:r>
-            <a:r>
-              <a:rPr i="1" dirty="0">
-                <a:solidFill>
-                  <a:srgbClr val="60A0B0"/>
-                </a:solidFill>
-                <a:latin typeface="Courier"/>
-              </a:rPr>
-              <a:t>).fit()</a:t>
-            </a:r>
-            <a:br>
-              <a:rPr dirty="0"/>
-            </a:br>
-            <a:r>
-              <a:rPr dirty="0" err="1">
-                <a:latin typeface="Courier"/>
-              </a:rPr>
-              <a:t>linear_model</a:t>
-            </a:r>
-            <a:r>
-              <a:rPr dirty="0">
-                <a:latin typeface="Courier"/>
-              </a:rPr>
-              <a:t> </a:t>
-            </a:r>
-            <a:r>
-              <a:rPr dirty="0">
-                <a:solidFill>
-                  <a:srgbClr val="666666"/>
-                </a:solidFill>
-                <a:latin typeface="Courier"/>
-              </a:rPr>
-              <a:t>=</a:t>
-            </a:r>
-            <a:r>
-              <a:rPr dirty="0">
-                <a:latin typeface="Courier"/>
-              </a:rPr>
-              <a:t> </a:t>
-            </a:r>
-            <a:r>
-              <a:rPr dirty="0" err="1">
-                <a:latin typeface="Courier"/>
-              </a:rPr>
-              <a:t>smf.ols</a:t>
-            </a:r>
-            <a:r>
-              <a:rPr dirty="0">
-                <a:latin typeface="Courier"/>
-              </a:rPr>
-              <a:t>(formula, data</a:t>
-            </a:r>
-            <a:r>
-              <a:rPr dirty="0">
-                <a:solidFill>
-                  <a:srgbClr val="666666"/>
-                </a:solidFill>
-                <a:latin typeface="Courier"/>
-              </a:rPr>
-              <a:t>=</a:t>
-            </a:r>
-            <a:r>
-              <a:rPr dirty="0" err="1">
-                <a:latin typeface="Courier"/>
-              </a:rPr>
-              <a:t>test_scores_train</a:t>
-            </a:r>
-            <a:r>
-              <a:rPr dirty="0">
-                <a:latin typeface="Courier"/>
-              </a:rPr>
-              <a:t>).fit()</a:t>
-            </a:r>
-            <a:br>
-              <a:rPr dirty="0"/>
-            </a:br>
-            <a:r>
-              <a:rPr dirty="0" err="1">
-                <a:latin typeface="Courier"/>
-              </a:rPr>
-              <a:t>linear_model.summary</a:t>
-            </a:r>
-            <a:r>
-              <a:rPr dirty="0">
-                <a:latin typeface="Courier"/>
-              </a:rPr>
-              <a:t>()</a:t>
-            </a:r>
-          </a:p>
-          <a:p>
-            <a:pPr lvl="0" indent="0">
-              <a:buNone/>
-            </a:pPr>
-            <a:r>
-              <a:rPr dirty="0">
-                <a:latin typeface="Courier"/>
-              </a:rPr>
-              <a:t>## &lt;class '</a:t>
-            </a:r>
-            <a:r>
-              <a:rPr dirty="0" err="1">
-                <a:latin typeface="Courier"/>
-              </a:rPr>
-              <a:t>statsmodels.iolib.summary.Summary</a:t>
-            </a:r>
-            <a:r>
-              <a:rPr dirty="0">
-                <a:latin typeface="Courier"/>
-              </a:rPr>
-              <a:t>'&gt;
-## """
-##                             OLS Regression Results                            
-## ==============================================================================
-## Dep. Variable:                  </a:t>
-            </a:r>
-            <a:r>
-              <a:rPr dirty="0" err="1">
-                <a:latin typeface="Courier"/>
-              </a:rPr>
-              <a:t>socst</a:t>
-            </a:r>
-            <a:r>
-              <a:rPr dirty="0">
-                <a:latin typeface="Courier"/>
-              </a:rPr>
-              <a:t>   R-squared:                       0.348
-## Model:                            OLS   Adj. R-squared:                  0.309
-## Method:                 Least Squares   F-statistic:                     8.753
-## Date:                Thu, 15 Aug 2024   Prob (F-statistic):           1.55e-09
-## Time:                        19:32:47   Log-Likelihood:                -495.01
-## No. Observations:                 140   AIC:                             1008.
-## </a:t>
-            </a:r>
-            <a:r>
-              <a:rPr dirty="0" err="1">
-                <a:latin typeface="Courier"/>
-              </a:rPr>
-              <a:t>Df</a:t>
-            </a:r>
-            <a:r>
-              <a:rPr dirty="0">
-                <a:latin typeface="Courier"/>
-              </a:rPr>
-              <a:t> Residuals:                     131   BIC:                             1035.
-## </a:t>
-            </a:r>
-            <a:r>
-              <a:rPr dirty="0" err="1">
-                <a:latin typeface="Courier"/>
-              </a:rPr>
-              <a:t>Df</a:t>
-            </a:r>
-            <a:r>
-              <a:rPr dirty="0">
-                <a:latin typeface="Courier"/>
-              </a:rPr>
-              <a:t> Model:                           8                                         
-## Covariance Type:            </a:t>
-            </a:r>
-            <a:r>
-              <a:rPr dirty="0" err="1">
-                <a:latin typeface="Courier"/>
-              </a:rPr>
-              <a:t>nonrobust</a:t>
-            </a:r>
-            <a:r>
-              <a:rPr dirty="0">
-                <a:latin typeface="Courier"/>
-              </a:rPr>
-              <a:t>                                         
-## ============================================================================================
-##                                </a:t>
-            </a:r>
-            <a:r>
-              <a:rPr dirty="0" err="1">
-                <a:latin typeface="Courier"/>
-              </a:rPr>
-              <a:t>coef</a:t>
-            </a:r>
-            <a:r>
-              <a:rPr dirty="0">
-                <a:latin typeface="Courier"/>
-              </a:rPr>
-              <a:t>    std err          t      P&gt;|t|      [0.025      0.975]
-## --------------------------------------------------------------------------------------------
-## Intercept                   46.1667      2.478     18.627      0.000      41.264      51.070
-## C(</a:t>
-            </a:r>
-            <a:r>
-              <a:rPr dirty="0" err="1">
-                <a:latin typeface="Courier"/>
-              </a:rPr>
-              <a:t>ses</a:t>
-            </a:r>
-            <a:r>
-              <a:rPr dirty="0">
-                <a:latin typeface="Courier"/>
-              </a:rPr>
-              <a:t>)[T.2]                  3.7564      3.437      1.093      0.276      -3.043      10.556
-## C(</a:t>
-            </a:r>
-            <a:r>
-              <a:rPr dirty="0" err="1">
-                <a:latin typeface="Courier"/>
-              </a:rPr>
-              <a:t>ses</a:t>
-            </a:r>
-            <a:r>
-              <a:rPr dirty="0">
-                <a:latin typeface="Courier"/>
-              </a:rPr>
-              <a:t>)[T.3]                 10.3333      4.293      2.407      0.017       1.841      18.826
-## C(prog)[T.2]                 6.0476      3.378      1.791      0.076      -0.634      12.729
-## C(prog)[T.3]               -10.2917      3.919     -2.626      0.010     -18.044      -2.539
-## C(</a:t>
-            </a:r>
-            <a:r>
-              <a:rPr dirty="0" err="1">
-                <a:latin typeface="Courier"/>
-              </a:rPr>
-              <a:t>ses</a:t>
-            </a:r>
-            <a:r>
-              <a:rPr dirty="0">
-                <a:latin typeface="Courier"/>
-              </a:rPr>
-              <a:t>)[T.2]:C(prog)[T.2]    -0.8457      4.402     -0.192      0.848      -9.555       7.863
-## C(</a:t>
-            </a:r>
-            <a:r>
-              <a:rPr dirty="0" err="1">
-                <a:latin typeface="Courier"/>
-              </a:rPr>
-              <a:t>ses</a:t>
-            </a:r>
-            <a:r>
-              <a:rPr dirty="0">
-                <a:latin typeface="Courier"/>
-              </a:rPr>
-              <a:t>)[T.3]:C(prog)[T.2]    -2.5476      5.114     -0.498      0.619     -12.664       7.569
-## C(</a:t>
-            </a:r>
-            <a:r>
-              <a:rPr dirty="0" err="1">
-                <a:latin typeface="Courier"/>
-              </a:rPr>
-              <a:t>ses</a:t>
-            </a:r>
-            <a:r>
-              <a:rPr dirty="0">
-                <a:latin typeface="Courier"/>
-              </a:rPr>
-              <a:t>)[T.2]:C(prog)[T.3]     9.2257      4.954      1.862      0.065      -0.573      19.025
-## C(</a:t>
-            </a:r>
-            <a:r>
-              <a:rPr dirty="0" err="1">
-                <a:latin typeface="Courier"/>
-              </a:rPr>
-              <a:t>ses</a:t>
-            </a:r>
-            <a:r>
-              <a:rPr dirty="0">
-                <a:latin typeface="Courier"/>
-              </a:rPr>
-              <a:t>)[T.3]:C(prog)[T.3]     1.2917      6.788      0.190      0.849     -12.136      14.719
-## ==============================================================================
-## Omnibus:                       10.190   Durbin-Watson:                   2.059
-## Prob(Omnibus):                  0.006   Jarque-Bera (JB):               10.371
-## Skew:                          -0.651   Prob(JB):                      0.00560
-## Kurtosis:                       3.290   Cond. No.                         18.7
-## ==============================================================================
-## 
-## Notes:
-## [1] Standard Errors assume that the covariance matrix of the errors is correctly specified.
-## """</a:t>
-            </a:r>
-          </a:p>
-        </p:txBody>
-      </p:sp>
+      <mc:AlternateContent xmlns:mc="http://schemas.openxmlformats.org/markup-compatibility/2006">
+        <mc:Choice xmlns:a14="http://schemas.microsoft.com/office/drawing/2010/main" Requires="a14">
+          <p:sp>
+            <p:nvSpPr>
+              <p:cNvPr id="8" name="Content Placeholder 2">
+                <a:extLst>
+                  <a:ext uri="{FF2B5EF4-FFF2-40B4-BE49-F238E27FC236}">
+                    <a16:creationId xmlns:a16="http://schemas.microsoft.com/office/drawing/2014/main" id="{D4816957-6B06-FDA1-772D-8065C15B6E43}"/>
+                  </a:ext>
+                </a:extLst>
+              </p:cNvPr>
+              <p:cNvSpPr txBox="1">
+                <a:spLocks/>
+              </p:cNvSpPr>
+              <p:nvPr/>
+            </p:nvSpPr>
+            <p:spPr>
+              <a:xfrm>
+                <a:off x="457200" y="1063228"/>
+                <a:ext cx="4050449" cy="3943619"/>
+              </a:xfrm>
+              <a:prstGeom prst="rect">
+                <a:avLst/>
+              </a:prstGeom>
+            </p:spPr>
+            <p:txBody>
+              <a:bodyPr vert="horz" lIns="91440" tIns="45720" rIns="91440" bIns="45720" rtlCol="0">
+                <a:normAutofit/>
+              </a:bodyPr>
+              <a:lstStyle>
+                <a:lvl1pPr marL="342900" indent="-342900" algn="l" defTabSz="342900" rtl="0" eaLnBrk="1" latinLnBrk="0" hangingPunct="1">
+                  <a:spcBef>
+                    <a:spcPct val="20000"/>
+                  </a:spcBef>
+                  <a:buFont typeface="Arial"/>
+                  <a:buChar char="•"/>
+                  <a:defRPr sz="2400" kern="1200">
+                    <a:solidFill>
+                      <a:schemeClr val="tx1"/>
+                    </a:solidFill>
+                    <a:latin typeface="+mn-lt"/>
+                    <a:ea typeface="+mn-ea"/>
+                    <a:cs typeface="+mn-cs"/>
+                  </a:defRPr>
+                </a:lvl1pPr>
+                <a:lvl2pPr marL="685800" indent="-342900" algn="l" defTabSz="342900" rtl="0" eaLnBrk="1" latinLnBrk="0" hangingPunct="1">
+                  <a:spcBef>
+                    <a:spcPct val="20000"/>
+                  </a:spcBef>
+                  <a:buFont typeface="Arial"/>
+                  <a:buChar char="–"/>
+                  <a:defRPr sz="2100" kern="1200">
+                    <a:solidFill>
+                      <a:schemeClr val="tx1"/>
+                    </a:solidFill>
+                    <a:latin typeface="+mn-lt"/>
+                    <a:ea typeface="+mn-ea"/>
+                    <a:cs typeface="+mn-cs"/>
+                  </a:defRPr>
+                </a:lvl2pPr>
+                <a:lvl3pPr marL="1028700" indent="-342900" algn="l" defTabSz="342900" rtl="0" eaLnBrk="1" latinLnBrk="0" hangingPunct="1">
+                  <a:spcBef>
+                    <a:spcPct val="20000"/>
+                  </a:spcBef>
+                  <a:buFont typeface="Arial"/>
+                  <a:buChar char="•"/>
+                  <a:defRPr sz="1800" kern="1200">
+                    <a:solidFill>
+                      <a:schemeClr val="tx1"/>
+                    </a:solidFill>
+                    <a:latin typeface="+mn-lt"/>
+                    <a:ea typeface="+mn-ea"/>
+                    <a:cs typeface="+mn-cs"/>
+                  </a:defRPr>
+                </a:lvl3pPr>
+                <a:lvl4pPr marL="1371600" indent="-342900" algn="l" defTabSz="342900" rtl="0" eaLnBrk="1" latinLnBrk="0" hangingPunct="1">
+                  <a:spcBef>
+                    <a:spcPct val="20000"/>
+                  </a:spcBef>
+                  <a:buFont typeface="Arial"/>
+                  <a:buChar char="–"/>
+                  <a:defRPr sz="1500" kern="1200">
+                    <a:solidFill>
+                      <a:schemeClr val="tx1"/>
+                    </a:solidFill>
+                    <a:latin typeface="+mn-lt"/>
+                    <a:ea typeface="+mn-ea"/>
+                    <a:cs typeface="+mn-cs"/>
+                  </a:defRPr>
+                </a:lvl4pPr>
+                <a:lvl5pPr marL="1714500" indent="-342900" algn="l" defTabSz="342900" rtl="0" eaLnBrk="1" latinLnBrk="0" hangingPunct="1">
+                  <a:spcBef>
+                    <a:spcPct val="20000"/>
+                  </a:spcBef>
+                  <a:buFont typeface="Arial"/>
+                  <a:buChar char="»"/>
+                  <a:defRPr sz="1500" kern="1200">
+                    <a:solidFill>
+                      <a:schemeClr val="tx1"/>
+                    </a:solidFill>
+                    <a:latin typeface="+mn-lt"/>
+                    <a:ea typeface="+mn-ea"/>
+                    <a:cs typeface="+mn-cs"/>
+                  </a:defRPr>
+                </a:lvl5pPr>
+                <a:lvl6pPr marL="2057400" indent="-342900" algn="l" defTabSz="342900" rtl="0" eaLnBrk="1" latinLnBrk="0" hangingPunct="1">
+                  <a:spcBef>
+                    <a:spcPct val="20000"/>
+                  </a:spcBef>
+                  <a:buFont typeface="Arial"/>
+                  <a:buChar char="•"/>
+                  <a:defRPr sz="1500" kern="1200">
+                    <a:solidFill>
+                      <a:schemeClr val="tx1"/>
+                    </a:solidFill>
+                    <a:latin typeface="+mn-lt"/>
+                    <a:ea typeface="+mn-ea"/>
+                    <a:cs typeface="+mn-cs"/>
+                  </a:defRPr>
+                </a:lvl6pPr>
+                <a:lvl7pPr marL="2400300" indent="-342900" algn="l" defTabSz="342900" rtl="0" eaLnBrk="1" latinLnBrk="0" hangingPunct="1">
+                  <a:spcBef>
+                    <a:spcPct val="20000"/>
+                  </a:spcBef>
+                  <a:buFont typeface="Arial"/>
+                  <a:buChar char="•"/>
+                  <a:defRPr sz="1500" kern="1200">
+                    <a:solidFill>
+                      <a:schemeClr val="tx1"/>
+                    </a:solidFill>
+                    <a:latin typeface="+mn-lt"/>
+                    <a:ea typeface="+mn-ea"/>
+                    <a:cs typeface="+mn-cs"/>
+                  </a:defRPr>
+                </a:lvl7pPr>
+                <a:lvl8pPr marL="2743200" indent="-342900" algn="l" defTabSz="342900" rtl="0" eaLnBrk="1" latinLnBrk="0" hangingPunct="1">
+                  <a:spcBef>
+                    <a:spcPct val="20000"/>
+                  </a:spcBef>
+                  <a:buFont typeface="Arial"/>
+                  <a:buChar char="•"/>
+                  <a:defRPr sz="1500" kern="1200">
+                    <a:solidFill>
+                      <a:schemeClr val="tx1"/>
+                    </a:solidFill>
+                    <a:latin typeface="+mn-lt"/>
+                    <a:ea typeface="+mn-ea"/>
+                    <a:cs typeface="+mn-cs"/>
+                  </a:defRPr>
+                </a:lvl8pPr>
+                <a:lvl9pPr marL="3086100" indent="-342900" algn="l" defTabSz="342900" rtl="0" eaLnBrk="1" latinLnBrk="0" hangingPunct="1">
+                  <a:spcBef>
+                    <a:spcPct val="20000"/>
+                  </a:spcBef>
+                  <a:buFont typeface="Arial"/>
+                  <a:buChar char="•"/>
+                  <a:defRPr sz="1500" kern="1200">
+                    <a:solidFill>
+                      <a:schemeClr val="tx1"/>
+                    </a:solidFill>
+                    <a:latin typeface="+mn-lt"/>
+                    <a:ea typeface="+mn-ea"/>
+                    <a:cs typeface="+mn-cs"/>
+                  </a:defRPr>
+                </a:lvl9pPr>
+              </a:lstStyle>
+              <a:p>
+                <a:pPr marL="0" indent="0">
+                  <a:buFont typeface="Arial"/>
+                  <a:buNone/>
+                </a:pPr>
+                <a:r>
+                  <a:rPr lang="en-US" sz="2000" dirty="0"/>
+                  <a:t>Model with all terms and interaction terms on the HSB2 data</a:t>
+                </a:r>
+              </a:p>
+              <a:p>
+                <a:pPr marL="0" indent="0">
+                  <a:buFont typeface="Arial"/>
+                  <a:buNone/>
+                </a:pPr>
+                <a14:m>
+                  <m:oMathPara xmlns:m="http://schemas.openxmlformats.org/officeDocument/2006/math">
+                    <m:oMathParaPr>
+                      <m:jc m:val="centerGroup"/>
+                    </m:oMathParaPr>
+                    <m:oMath xmlns:m="http://schemas.openxmlformats.org/officeDocument/2006/math">
+                      <m:r>
+                        <a:rPr lang="en-US" sz="2000" b="0" i="1" smtClean="0">
+                          <a:solidFill>
+                            <a:schemeClr val="accent3">
+                              <a:lumMod val="50000"/>
+                            </a:schemeClr>
+                          </a:solidFill>
+                          <a:latin typeface="Cambria Math" panose="02040503050406030204" pitchFamily="18" charset="0"/>
+                        </a:rPr>
+                        <m:t>𝑠𝑜𝑐𝑠𝑡</m:t>
+                      </m:r>
+                      <m:r>
+                        <a:rPr lang="en-US" sz="2000" b="0" i="1" smtClean="0">
+                          <a:solidFill>
+                            <a:schemeClr val="accent3">
+                              <a:lumMod val="50000"/>
+                            </a:schemeClr>
+                          </a:solidFill>
+                          <a:latin typeface="Cambria Math" panose="02040503050406030204" pitchFamily="18" charset="0"/>
+                          <a:ea typeface="Cambria Math" panose="02040503050406030204" pitchFamily="18" charset="0"/>
+                        </a:rPr>
+                        <m:t>~</m:t>
+                      </m:r>
+                      <m:r>
+                        <a:rPr lang="en-US" sz="2000" b="0" i="1" smtClean="0">
+                          <a:solidFill>
+                            <a:schemeClr val="accent3">
+                              <a:lumMod val="50000"/>
+                            </a:schemeClr>
+                          </a:solidFill>
+                          <a:latin typeface="Cambria Math" panose="02040503050406030204" pitchFamily="18" charset="0"/>
+                          <a:ea typeface="Cambria Math" panose="02040503050406030204" pitchFamily="18" charset="0"/>
+                        </a:rPr>
+                        <m:t>𝐶</m:t>
+                      </m:r>
+                      <m:d>
+                        <m:dPr>
+                          <m:ctrlPr>
+                            <a:rPr lang="en-US" sz="2000" b="0" i="1" smtClean="0">
+                              <a:solidFill>
+                                <a:schemeClr val="accent3">
+                                  <a:lumMod val="50000"/>
+                                </a:schemeClr>
+                              </a:solidFill>
+                              <a:latin typeface="Cambria Math" panose="02040503050406030204" pitchFamily="18" charset="0"/>
+                              <a:ea typeface="Cambria Math" panose="02040503050406030204" pitchFamily="18" charset="0"/>
+                            </a:rPr>
+                          </m:ctrlPr>
+                        </m:dPr>
+                        <m:e>
+                          <m:r>
+                            <a:rPr lang="en-US" sz="2000" b="0" i="1" smtClean="0">
+                              <a:solidFill>
+                                <a:schemeClr val="accent3">
+                                  <a:lumMod val="50000"/>
+                                </a:schemeClr>
+                              </a:solidFill>
+                              <a:latin typeface="Cambria Math" panose="02040503050406030204" pitchFamily="18" charset="0"/>
+                              <a:ea typeface="Cambria Math" panose="02040503050406030204" pitchFamily="18" charset="0"/>
+                            </a:rPr>
+                            <m:t>𝑠𝑒𝑠</m:t>
+                          </m:r>
+                        </m:e>
+                      </m:d>
+                      <m:r>
+                        <a:rPr lang="en-US" sz="2000" b="0" i="1" smtClean="0">
+                          <a:solidFill>
+                            <a:schemeClr val="accent3">
+                              <a:lumMod val="50000"/>
+                            </a:schemeClr>
+                          </a:solidFill>
+                          <a:latin typeface="Cambria Math" panose="02040503050406030204" pitchFamily="18" charset="0"/>
+                          <a:ea typeface="Cambria Math" panose="02040503050406030204" pitchFamily="18" charset="0"/>
+                        </a:rPr>
+                        <m:t>∗</m:t>
+                      </m:r>
+                      <m:r>
+                        <a:rPr lang="en-US" sz="2000" b="0" i="1" smtClean="0">
+                          <a:solidFill>
+                            <a:schemeClr val="accent3">
+                              <a:lumMod val="50000"/>
+                            </a:schemeClr>
+                          </a:solidFill>
+                          <a:latin typeface="Cambria Math" panose="02040503050406030204" pitchFamily="18" charset="0"/>
+                          <a:ea typeface="Cambria Math" panose="02040503050406030204" pitchFamily="18" charset="0"/>
+                        </a:rPr>
+                        <m:t>𝐶</m:t>
+                      </m:r>
+                      <m:d>
+                        <m:dPr>
+                          <m:ctrlPr>
+                            <a:rPr lang="en-US" sz="2000" b="0" i="1" smtClean="0">
+                              <a:solidFill>
+                                <a:schemeClr val="accent3">
+                                  <a:lumMod val="50000"/>
+                                </a:schemeClr>
+                              </a:solidFill>
+                              <a:latin typeface="Cambria Math" panose="02040503050406030204" pitchFamily="18" charset="0"/>
+                              <a:ea typeface="Cambria Math" panose="02040503050406030204" pitchFamily="18" charset="0"/>
+                            </a:rPr>
+                          </m:ctrlPr>
+                        </m:dPr>
+                        <m:e>
+                          <m:r>
+                            <a:rPr lang="en-US" sz="2000" b="0" i="1" smtClean="0">
+                              <a:solidFill>
+                                <a:schemeClr val="accent3">
+                                  <a:lumMod val="50000"/>
+                                </a:schemeClr>
+                              </a:solidFill>
+                              <a:latin typeface="Cambria Math" panose="02040503050406030204" pitchFamily="18" charset="0"/>
+                              <a:ea typeface="Cambria Math" panose="02040503050406030204" pitchFamily="18" charset="0"/>
+                            </a:rPr>
+                            <m:t>𝑝𝑟𝑜𝑔</m:t>
+                          </m:r>
+                        </m:e>
+                      </m:d>
+                    </m:oMath>
+                  </m:oMathPara>
+                </a14:m>
+                <a:endParaRPr lang="en-US" sz="2000" dirty="0">
+                  <a:solidFill>
+                    <a:schemeClr val="accent3">
+                      <a:lumMod val="50000"/>
+                    </a:schemeClr>
+                  </a:solidFill>
+                </a:endParaRPr>
+              </a:p>
+              <a:p>
+                <a:r>
+                  <a:rPr lang="en-US" sz="2000" dirty="0"/>
+                  <a:t>Note the </a:t>
+                </a:r>
+                <a14:m>
+                  <m:oMath xmlns:m="http://schemas.openxmlformats.org/officeDocument/2006/math">
+                    <m:sSubSup>
+                      <m:sSubSupPr>
+                        <m:ctrlPr>
+                          <a:rPr lang="en-US" sz="2000" i="1" smtClean="0">
+                            <a:latin typeface="Cambria Math" panose="02040503050406030204" pitchFamily="18" charset="0"/>
+                          </a:rPr>
+                        </m:ctrlPr>
+                      </m:sSubSupPr>
+                      <m:e>
+                        <m:r>
+                          <a:rPr lang="en-US" sz="2000" b="0" i="1" smtClean="0">
+                            <a:latin typeface="Cambria Math" panose="02040503050406030204" pitchFamily="18" charset="0"/>
+                          </a:rPr>
+                          <m:t>𝑅</m:t>
+                        </m:r>
+                      </m:e>
+                      <m:sub>
+                        <m:r>
+                          <a:rPr lang="en-US" sz="2000" b="0" i="1" smtClean="0">
+                            <a:latin typeface="Cambria Math" panose="02040503050406030204" pitchFamily="18" charset="0"/>
+                          </a:rPr>
+                          <m:t>𝑎𝑑𝑗</m:t>
+                        </m:r>
+                      </m:sub>
+                      <m:sup>
+                        <m:r>
+                          <a:rPr lang="en-US" sz="2000" b="0" i="1" smtClean="0">
+                            <a:latin typeface="Cambria Math" panose="02040503050406030204" pitchFamily="18" charset="0"/>
+                          </a:rPr>
+                          <m:t>2</m:t>
+                        </m:r>
+                      </m:sup>
+                    </m:sSubSup>
+                  </m:oMath>
+                </a14:m>
+                <a:r>
+                  <a:rPr lang="en-US" sz="2000" dirty="0"/>
+                  <a:t> and F-statistic </a:t>
+                </a:r>
+              </a:p>
+              <a:p>
+                <a:r>
+                  <a:rPr lang="en-US" sz="2000" dirty="0"/>
+                  <a:t>The model is </a:t>
+                </a:r>
+                <a:r>
+                  <a:rPr lang="en-US" sz="2000" b="1" dirty="0"/>
+                  <a:t>overfit</a:t>
+                </a:r>
+                <a:r>
+                  <a:rPr lang="en-US" sz="2000" dirty="0"/>
+                  <a:t> as not all terms are significant</a:t>
+                </a:r>
+              </a:p>
+              <a:p>
+                <a:pPr lvl="1"/>
+                <a:r>
+                  <a:rPr lang="en-US" sz="1700" dirty="0"/>
+                  <a:t>Not all p-values show significance</a:t>
+                </a:r>
+              </a:p>
+              <a:p>
+                <a:pPr lvl="1"/>
+                <a:r>
+                  <a:rPr lang="en-US" sz="1700" dirty="0"/>
+                  <a:t>Standard error is larger than magnitude of some coefficient values  </a:t>
+                </a:r>
+                <a:endParaRPr lang="en-US" sz="1700" b="1" dirty="0"/>
+              </a:p>
+            </p:txBody>
+          </p:sp>
+        </mc:Choice>
+        <mc:Fallback>
+          <p:sp>
+            <p:nvSpPr>
+              <p:cNvPr id="8" name="Content Placeholder 2">
+                <a:extLst>
+                  <a:ext uri="{FF2B5EF4-FFF2-40B4-BE49-F238E27FC236}">
+                    <a16:creationId xmlns:a16="http://schemas.microsoft.com/office/drawing/2014/main" id="{D4816957-6B06-FDA1-772D-8065C15B6E43}"/>
+                  </a:ext>
+                </a:extLst>
+              </p:cNvPr>
+              <p:cNvSpPr txBox="1">
+                <a:spLocks noRot="1" noChangeAspect="1" noMove="1" noResize="1" noEditPoints="1" noAdjustHandles="1" noChangeArrowheads="1" noChangeShapeType="1" noTextEdit="1"/>
+              </p:cNvSpPr>
+              <p:nvPr/>
+            </p:nvSpPr>
+            <p:spPr>
+              <a:xfrm>
+                <a:off x="457200" y="1063228"/>
+                <a:ext cx="4050449" cy="3943619"/>
+              </a:xfrm>
+              <a:prstGeom prst="rect">
+                <a:avLst/>
+              </a:prstGeom>
+              <a:blipFill>
+                <a:blip r:embed="rId2"/>
+                <a:stretch>
+                  <a:fillRect l="-1506" t="-773" r="-602"/>
+                </a:stretch>
+              </a:blipFill>
+            </p:spPr>
+            <p:txBody>
+              <a:bodyPr/>
+              <a:lstStyle/>
+              <a:p>
+                <a:r>
+                  <a:rPr lang="en-US">
+                    <a:noFill/>
+                  </a:rPr>
+                  <a:t> </a:t>
+                </a:r>
+              </a:p>
+            </p:txBody>
+          </p:sp>
+        </mc:Fallback>
+      </mc:AlternateContent>
+      <p:pic>
+        <p:nvPicPr>
+          <p:cNvPr id="12" name="Picture 11">
+            <a:extLst>
+              <a:ext uri="{FF2B5EF4-FFF2-40B4-BE49-F238E27FC236}">
+                <a16:creationId xmlns:a16="http://schemas.microsoft.com/office/drawing/2014/main" id="{013E6A3A-AD28-466A-363B-7E206189A860}"/>
+              </a:ext>
+            </a:extLst>
+          </p:cNvPr>
+          <p:cNvPicPr>
+            <a:picLocks noChangeAspect="1"/>
+          </p:cNvPicPr>
+          <p:nvPr/>
+        </p:nvPicPr>
+        <p:blipFill>
+          <a:blip r:embed="rId3"/>
+          <a:stretch>
+            <a:fillRect/>
+          </a:stretch>
+        </p:blipFill>
+        <p:spPr>
+          <a:xfrm>
+            <a:off x="4507649" y="1441061"/>
+            <a:ext cx="4559135" cy="3118627"/>
+          </a:xfrm>
+          <a:prstGeom prst="rect">
+            <a:avLst/>
+          </a:prstGeom>
+        </p:spPr>
+      </p:pic>
+      <p:cxnSp>
+        <p:nvCxnSpPr>
+          <p:cNvPr id="13" name="Straight Arrow Connector 12">
+            <a:extLst>
+              <a:ext uri="{FF2B5EF4-FFF2-40B4-BE49-F238E27FC236}">
+                <a16:creationId xmlns:a16="http://schemas.microsoft.com/office/drawing/2014/main" id="{C506363D-DF1C-0F49-B54F-49B4AB82B330}"/>
+              </a:ext>
+            </a:extLst>
+          </p:cNvPr>
+          <p:cNvCxnSpPr>
+            <a:cxnSpLocks/>
+          </p:cNvCxnSpPr>
+          <p:nvPr/>
+        </p:nvCxnSpPr>
+        <p:spPr>
+          <a:xfrm flipV="1">
+            <a:off x="3970528" y="1845056"/>
+            <a:ext cx="4596384" cy="459232"/>
+          </a:xfrm>
+          <a:prstGeom prst="straightConnector1">
+            <a:avLst/>
+          </a:prstGeom>
+          <a:ln>
+            <a:solidFill>
+              <a:schemeClr val="tx1"/>
+            </a:solidFill>
+            <a:tailEnd type="triangle"/>
+          </a:ln>
+        </p:spPr>
+        <p:style>
+          <a:lnRef idx="2">
+            <a:schemeClr val="accent1"/>
+          </a:lnRef>
+          <a:fillRef idx="0">
+            <a:schemeClr val="accent1"/>
+          </a:fillRef>
+          <a:effectRef idx="1">
+            <a:schemeClr val="accent1"/>
+          </a:effectRef>
+          <a:fontRef idx="minor">
+            <a:schemeClr val="tx1"/>
+          </a:fontRef>
+        </p:style>
+      </p:cxnSp>
+      <p:cxnSp>
+        <p:nvCxnSpPr>
+          <p:cNvPr id="16" name="Straight Arrow Connector 15">
+            <a:extLst>
+              <a:ext uri="{FF2B5EF4-FFF2-40B4-BE49-F238E27FC236}">
+                <a16:creationId xmlns:a16="http://schemas.microsoft.com/office/drawing/2014/main" id="{DBA877F2-BD6F-77BA-066E-204E953FE9C5}"/>
+              </a:ext>
+            </a:extLst>
+          </p:cNvPr>
+          <p:cNvCxnSpPr>
+            <a:cxnSpLocks/>
+          </p:cNvCxnSpPr>
+          <p:nvPr/>
+        </p:nvCxnSpPr>
+        <p:spPr>
+          <a:xfrm>
+            <a:off x="3970528" y="2755392"/>
+            <a:ext cx="2824480" cy="0"/>
+          </a:xfrm>
+          <a:prstGeom prst="straightConnector1">
+            <a:avLst/>
+          </a:prstGeom>
+          <a:ln>
+            <a:solidFill>
+              <a:schemeClr val="tx1"/>
+            </a:solidFill>
+            <a:tailEnd type="triangle"/>
+          </a:ln>
+        </p:spPr>
+        <p:style>
+          <a:lnRef idx="2">
+            <a:schemeClr val="accent1"/>
+          </a:lnRef>
+          <a:fillRef idx="0">
+            <a:schemeClr val="accent1"/>
+          </a:fillRef>
+          <a:effectRef idx="1">
+            <a:schemeClr val="accent1"/>
+          </a:effectRef>
+          <a:fontRef idx="minor">
+            <a:schemeClr val="tx1"/>
+          </a:fontRef>
+        </p:style>
+      </p:cxnSp>
     </p:spTree>
   </p:cSld>
   <p:clrMapOvr>
@@ -16389,403 +16587,572 @@
               <a:buNone/>
             </a:pPr>
             <a:r>
+              <a:rPr dirty="0"/>
               <a:t>Dealing with Overfit Models</a:t>
             </a:r>
           </a:p>
         </p:txBody>
       </p:sp>
-      <p:sp>
-        <p:nvSpPr>
-          <p:cNvPr id="3" name="Content Placeholder 2"/>
-          <p:cNvSpPr>
-            <a:spLocks noGrp="1"/>
-          </p:cNvSpPr>
-          <p:nvPr>
-            <p:ph idx="1"/>
-          </p:nvPr>
-        </p:nvSpPr>
-        <p:spPr/>
-        <p:txBody>
-          <a:bodyPr>
-            <a:normAutofit fontScale="25000" lnSpcReduction="20000"/>
-          </a:bodyPr>
-          <a:lstStyle/>
-          <a:p>
-            <a:pPr marL="0" lvl="0" indent="0">
-              <a:buNone/>
-            </a:pPr>
-            <a:r>
-              <a:rPr dirty="0"/>
-              <a:t>Example: After 3 or 4 rounds of </a:t>
-            </a:r>
-            <a:r>
-              <a:rPr i="1" dirty="0"/>
-              <a:t>guess and cut</a:t>
-            </a:r>
-            <a:r>
-              <a:rPr dirty="0"/>
-              <a:t> feature pruning, we arrive at a model with only significant coefficients:</a:t>
-            </a:r>
-          </a:p>
-          <a:p>
-            <a:pPr lvl="0" indent="0">
-              <a:buNone/>
-            </a:pPr>
-            <a:r>
-              <a:rPr dirty="0" err="1">
-                <a:latin typeface="Courier"/>
-              </a:rPr>
-              <a:t>linear_model</a:t>
-            </a:r>
-            <a:r>
-              <a:rPr dirty="0">
-                <a:latin typeface="Courier"/>
-              </a:rPr>
-              <a:t> </a:t>
-            </a:r>
-            <a:r>
-              <a:rPr dirty="0">
-                <a:solidFill>
-                  <a:srgbClr val="666666"/>
-                </a:solidFill>
-                <a:latin typeface="Courier"/>
-              </a:rPr>
-              <a:t>=</a:t>
-            </a:r>
-            <a:r>
-              <a:rPr dirty="0">
-                <a:latin typeface="Courier"/>
-              </a:rPr>
-              <a:t> </a:t>
-            </a:r>
-            <a:r>
-              <a:rPr dirty="0" err="1">
-                <a:latin typeface="Courier"/>
-              </a:rPr>
-              <a:t>smf.ols</a:t>
-            </a:r>
-            <a:r>
-              <a:rPr dirty="0">
-                <a:latin typeface="Courier"/>
-              </a:rPr>
-              <a:t>(</a:t>
-            </a:r>
-            <a:r>
-              <a:rPr dirty="0">
-                <a:solidFill>
-                  <a:srgbClr val="4070A0"/>
-                </a:solidFill>
-                <a:latin typeface="Courier"/>
-              </a:rPr>
-              <a:t>"</a:t>
-            </a:r>
-            <a:r>
-              <a:rPr dirty="0" err="1">
-                <a:solidFill>
-                  <a:srgbClr val="4070A0"/>
-                </a:solidFill>
-                <a:latin typeface="Courier"/>
-              </a:rPr>
-              <a:t>socst</a:t>
-            </a:r>
-            <a:r>
-              <a:rPr dirty="0">
-                <a:solidFill>
-                  <a:srgbClr val="4070A0"/>
-                </a:solidFill>
-                <a:latin typeface="Courier"/>
-              </a:rPr>
-              <a:t> ~ - 1 + C(</a:t>
-            </a:r>
-            <a:r>
-              <a:rPr dirty="0" err="1">
-                <a:solidFill>
-                  <a:srgbClr val="4070A0"/>
-                </a:solidFill>
-                <a:latin typeface="Courier"/>
-              </a:rPr>
-              <a:t>ses</a:t>
-            </a:r>
-            <a:r>
-              <a:rPr dirty="0">
-                <a:solidFill>
-                  <a:srgbClr val="4070A0"/>
-                </a:solidFill>
-                <a:latin typeface="Courier"/>
-              </a:rPr>
-              <a:t>):C(prog)"</a:t>
-            </a:r>
-            <a:r>
-              <a:rPr dirty="0">
-                <a:latin typeface="Courier"/>
-              </a:rPr>
-              <a:t>, data</a:t>
-            </a:r>
-            <a:r>
-              <a:rPr dirty="0">
-                <a:solidFill>
-                  <a:srgbClr val="666666"/>
-                </a:solidFill>
-                <a:latin typeface="Courier"/>
-              </a:rPr>
-              <a:t>=</a:t>
-            </a:r>
-            <a:r>
-              <a:rPr dirty="0" err="1">
-                <a:latin typeface="Courier"/>
-              </a:rPr>
-              <a:t>test_scores_train</a:t>
-            </a:r>
-            <a:r>
-              <a:rPr dirty="0">
-                <a:latin typeface="Courier"/>
-              </a:rPr>
-              <a:t>).fit()</a:t>
-            </a:r>
-            <a:br>
-              <a:rPr dirty="0"/>
-            </a:br>
-            <a:r>
-              <a:rPr dirty="0" err="1">
-                <a:latin typeface="Courier"/>
-              </a:rPr>
-              <a:t>linear_model.summary</a:t>
-            </a:r>
-            <a:r>
-              <a:rPr dirty="0">
-                <a:latin typeface="Courier"/>
-              </a:rPr>
-              <a:t>()</a:t>
-            </a:r>
-          </a:p>
-          <a:p>
-            <a:pPr lvl="0" indent="0">
-              <a:buNone/>
-            </a:pPr>
-            <a:r>
-              <a:rPr dirty="0">
-                <a:latin typeface="Courier"/>
-              </a:rPr>
-              <a:t>## &lt;class '</a:t>
-            </a:r>
-            <a:r>
-              <a:rPr dirty="0" err="1">
-                <a:latin typeface="Courier"/>
-              </a:rPr>
-              <a:t>statsmodels.iolib.summary.Summary</a:t>
-            </a:r>
-            <a:r>
-              <a:rPr dirty="0">
-                <a:latin typeface="Courier"/>
-              </a:rPr>
-              <a:t>'&gt;
-## """
-##                             OLS Regression Results                            
-## ==============================================================================
-## Dep. Variable:                  </a:t>
-            </a:r>
-            <a:r>
-              <a:rPr dirty="0" err="1">
-                <a:latin typeface="Courier"/>
-              </a:rPr>
-              <a:t>socst</a:t>
-            </a:r>
-            <a:r>
-              <a:rPr dirty="0">
-                <a:latin typeface="Courier"/>
-              </a:rPr>
-              <a:t>   R-squared:                       0.348
-## Model:                            OLS   Adj. R-squared:                  0.309
-## Method:                 Least Squares   F-statistic:                     8.753
-## Date:                Thu, 15 Aug 2024   Prob (F-statistic):           1.55e-09
-## Time:                        19:32:47   Log-Likelihood:                -495.01
-## No. Observations:                 140   AIC:                             1008.
-## </a:t>
-            </a:r>
-            <a:r>
-              <a:rPr dirty="0" err="1">
-                <a:latin typeface="Courier"/>
-              </a:rPr>
-              <a:t>Df</a:t>
-            </a:r>
-            <a:r>
-              <a:rPr dirty="0">
-                <a:latin typeface="Courier"/>
-              </a:rPr>
-              <a:t> Residuals:                     131   BIC:                             1035.
-## </a:t>
-            </a:r>
-            <a:r>
-              <a:rPr dirty="0" err="1">
-                <a:latin typeface="Courier"/>
-              </a:rPr>
-              <a:t>Df</a:t>
-            </a:r>
-            <a:r>
-              <a:rPr dirty="0">
-                <a:latin typeface="Courier"/>
-              </a:rPr>
-              <a:t> Model:                           8                                         
-## Covariance Type:            </a:t>
-            </a:r>
-            <a:r>
-              <a:rPr dirty="0" err="1">
-                <a:latin typeface="Courier"/>
-              </a:rPr>
-              <a:t>nonrobust</a:t>
-            </a:r>
-            <a:r>
-              <a:rPr dirty="0">
-                <a:latin typeface="Courier"/>
-              </a:rPr>
-              <a:t>                                         
-## ========================================================================================
-##                            </a:t>
-            </a:r>
-            <a:r>
-              <a:rPr dirty="0" err="1">
-                <a:latin typeface="Courier"/>
-              </a:rPr>
-              <a:t>coef</a:t>
-            </a:r>
-            <a:r>
-              <a:rPr dirty="0">
-                <a:latin typeface="Courier"/>
-              </a:rPr>
-              <a:t>    std err          t      P&gt;|t|      [0.025      0.975]
-## ----------------------------------------------------------------------------------------
-## C(</a:t>
-            </a:r>
-            <a:r>
-              <a:rPr dirty="0" err="1">
-                <a:latin typeface="Courier"/>
-              </a:rPr>
-              <a:t>ses</a:t>
-            </a:r>
-            <a:r>
-              <a:rPr dirty="0">
-                <a:latin typeface="Courier"/>
-              </a:rPr>
-              <a:t>)[1]:C(prog)[1]    46.1667      2.478     18.627      0.000      41.264      51.070
-## C(</a:t>
-            </a:r>
-            <a:r>
-              <a:rPr dirty="0" err="1">
-                <a:latin typeface="Courier"/>
-              </a:rPr>
-              <a:t>ses</a:t>
-            </a:r>
-            <a:r>
-              <a:rPr dirty="0">
-                <a:latin typeface="Courier"/>
-              </a:rPr>
-              <a:t>)[2]:C(prog)[1]    49.9231      2.381     20.965      0.000      45.212      54.634
-## C(</a:t>
-            </a:r>
-            <a:r>
-              <a:rPr dirty="0" err="1">
-                <a:latin typeface="Courier"/>
-              </a:rPr>
-              <a:t>ses</a:t>
-            </a:r>
-            <a:r>
-              <a:rPr dirty="0">
-                <a:latin typeface="Courier"/>
-              </a:rPr>
-              <a:t>)[3]:C(prog)[1]    56.5000      3.505     16.120      0.000      49.566      63.434
-## C(</a:t>
-            </a:r>
-            <a:r>
-              <a:rPr dirty="0" err="1">
-                <a:latin typeface="Courier"/>
-              </a:rPr>
-              <a:t>ses</a:t>
-            </a:r>
-            <a:r>
-              <a:rPr dirty="0">
-                <a:latin typeface="Courier"/>
-              </a:rPr>
-              <a:t>)[1]:C(prog)[2]    52.2143      2.295     22.755      0.000      47.675      56.754
-## C(</a:t>
-            </a:r>
-            <a:r>
-              <a:rPr dirty="0" err="1">
-                <a:latin typeface="Courier"/>
-              </a:rPr>
-              <a:t>ses</a:t>
-            </a:r>
-            <a:r>
-              <a:rPr dirty="0">
-                <a:latin typeface="Courier"/>
-              </a:rPr>
-              <a:t>)[2]:C(prog)[2]    55.1250      1.518     36.320      0.000      52.123      58.127
-## C(</a:t>
-            </a:r>
-            <a:r>
-              <a:rPr dirty="0" err="1">
-                <a:latin typeface="Courier"/>
-              </a:rPr>
-              <a:t>ses</a:t>
-            </a:r>
-            <a:r>
-              <a:rPr dirty="0">
-                <a:latin typeface="Courier"/>
-              </a:rPr>
-              <a:t>)[3]:C(prog)[2]    60.0000      1.568     38.277      0.000      56.899      63.101
-## C(</a:t>
-            </a:r>
-            <a:r>
-              <a:rPr dirty="0" err="1">
-                <a:latin typeface="Courier"/>
-              </a:rPr>
-              <a:t>ses</a:t>
-            </a:r>
-            <a:r>
-              <a:rPr dirty="0">
-                <a:latin typeface="Courier"/>
-              </a:rPr>
-              <a:t>)[1]:C(prog)[3]    35.8750      3.035     11.819      0.000      29.870      41.880
-## C(</a:t>
-            </a:r>
-            <a:r>
-              <a:rPr dirty="0" err="1">
-                <a:latin typeface="Courier"/>
-              </a:rPr>
-              <a:t>ses</a:t>
-            </a:r>
-            <a:r>
-              <a:rPr dirty="0">
-                <a:latin typeface="Courier"/>
-              </a:rPr>
-              <a:t>)[2]:C(prog)[3]    48.8571      1.874     26.077      0.000      45.151      52.563
-## C(</a:t>
-            </a:r>
-            <a:r>
-              <a:rPr dirty="0" err="1">
-                <a:latin typeface="Courier"/>
-              </a:rPr>
-              <a:t>ses</a:t>
-            </a:r>
-            <a:r>
-              <a:rPr dirty="0">
-                <a:latin typeface="Courier"/>
-              </a:rPr>
-              <a:t>)[3]:C(prog)[3]    47.5000      4.293     11.065      0.000      39.008      55.992
-## ==============================================================================
-## Omnibus:                       10.190   Durbin-Watson:                   2.059
-## Prob(Omnibus):                  0.006   Jarque-Bera (JB):               10.371
-## Skew:                          -0.651   Prob(JB):                      0.00560
-## Kurtosis:                       3.290   Cond. No.                         2.83
-## ==============================================================================
-## 
-## Notes:
-## [1] Standard Errors assume that the covariance matrix of the errors is correctly specified.
-## """</a:t>
-            </a:r>
-          </a:p>
-        </p:txBody>
-      </p:sp>
+      <mc:AlternateContent xmlns:mc="http://schemas.openxmlformats.org/markup-compatibility/2006">
+        <mc:Choice xmlns:a14="http://schemas.microsoft.com/office/drawing/2010/main" Requires="a14">
+          <p:sp>
+            <p:nvSpPr>
+              <p:cNvPr id="8" name="Content Placeholder 2">
+                <a:extLst>
+                  <a:ext uri="{FF2B5EF4-FFF2-40B4-BE49-F238E27FC236}">
+                    <a16:creationId xmlns:a16="http://schemas.microsoft.com/office/drawing/2014/main" id="{D4816957-6B06-FDA1-772D-8065C15B6E43}"/>
+                  </a:ext>
+                </a:extLst>
+              </p:cNvPr>
+              <p:cNvSpPr txBox="1">
+                <a:spLocks/>
+              </p:cNvSpPr>
+              <p:nvPr/>
+            </p:nvSpPr>
+            <p:spPr>
+              <a:xfrm>
+                <a:off x="457200" y="1063228"/>
+                <a:ext cx="4050449" cy="3943619"/>
+              </a:xfrm>
+              <a:prstGeom prst="rect">
+                <a:avLst/>
+              </a:prstGeom>
+            </p:spPr>
+            <p:txBody>
+              <a:bodyPr vert="horz" lIns="91440" tIns="45720" rIns="91440" bIns="45720" rtlCol="0">
+                <a:normAutofit/>
+              </a:bodyPr>
+              <a:lstStyle>
+                <a:lvl1pPr marL="342900" indent="-342900" algn="l" defTabSz="342900" rtl="0" eaLnBrk="1" latinLnBrk="0" hangingPunct="1">
+                  <a:spcBef>
+                    <a:spcPct val="20000"/>
+                  </a:spcBef>
+                  <a:buFont typeface="Arial"/>
+                  <a:buChar char="•"/>
+                  <a:defRPr sz="2400" kern="1200">
+                    <a:solidFill>
+                      <a:schemeClr val="tx1"/>
+                    </a:solidFill>
+                    <a:latin typeface="+mn-lt"/>
+                    <a:ea typeface="+mn-ea"/>
+                    <a:cs typeface="+mn-cs"/>
+                  </a:defRPr>
+                </a:lvl1pPr>
+                <a:lvl2pPr marL="685800" indent="-342900" algn="l" defTabSz="342900" rtl="0" eaLnBrk="1" latinLnBrk="0" hangingPunct="1">
+                  <a:spcBef>
+                    <a:spcPct val="20000"/>
+                  </a:spcBef>
+                  <a:buFont typeface="Arial"/>
+                  <a:buChar char="–"/>
+                  <a:defRPr sz="2100" kern="1200">
+                    <a:solidFill>
+                      <a:schemeClr val="tx1"/>
+                    </a:solidFill>
+                    <a:latin typeface="+mn-lt"/>
+                    <a:ea typeface="+mn-ea"/>
+                    <a:cs typeface="+mn-cs"/>
+                  </a:defRPr>
+                </a:lvl2pPr>
+                <a:lvl3pPr marL="1028700" indent="-342900" algn="l" defTabSz="342900" rtl="0" eaLnBrk="1" latinLnBrk="0" hangingPunct="1">
+                  <a:spcBef>
+                    <a:spcPct val="20000"/>
+                  </a:spcBef>
+                  <a:buFont typeface="Arial"/>
+                  <a:buChar char="•"/>
+                  <a:defRPr sz="1800" kern="1200">
+                    <a:solidFill>
+                      <a:schemeClr val="tx1"/>
+                    </a:solidFill>
+                    <a:latin typeface="+mn-lt"/>
+                    <a:ea typeface="+mn-ea"/>
+                    <a:cs typeface="+mn-cs"/>
+                  </a:defRPr>
+                </a:lvl3pPr>
+                <a:lvl4pPr marL="1371600" indent="-342900" algn="l" defTabSz="342900" rtl="0" eaLnBrk="1" latinLnBrk="0" hangingPunct="1">
+                  <a:spcBef>
+                    <a:spcPct val="20000"/>
+                  </a:spcBef>
+                  <a:buFont typeface="Arial"/>
+                  <a:buChar char="–"/>
+                  <a:defRPr sz="1500" kern="1200">
+                    <a:solidFill>
+                      <a:schemeClr val="tx1"/>
+                    </a:solidFill>
+                    <a:latin typeface="+mn-lt"/>
+                    <a:ea typeface="+mn-ea"/>
+                    <a:cs typeface="+mn-cs"/>
+                  </a:defRPr>
+                </a:lvl4pPr>
+                <a:lvl5pPr marL="1714500" indent="-342900" algn="l" defTabSz="342900" rtl="0" eaLnBrk="1" latinLnBrk="0" hangingPunct="1">
+                  <a:spcBef>
+                    <a:spcPct val="20000"/>
+                  </a:spcBef>
+                  <a:buFont typeface="Arial"/>
+                  <a:buChar char="»"/>
+                  <a:defRPr sz="1500" kern="1200">
+                    <a:solidFill>
+                      <a:schemeClr val="tx1"/>
+                    </a:solidFill>
+                    <a:latin typeface="+mn-lt"/>
+                    <a:ea typeface="+mn-ea"/>
+                    <a:cs typeface="+mn-cs"/>
+                  </a:defRPr>
+                </a:lvl5pPr>
+                <a:lvl6pPr marL="2057400" indent="-342900" algn="l" defTabSz="342900" rtl="0" eaLnBrk="1" latinLnBrk="0" hangingPunct="1">
+                  <a:spcBef>
+                    <a:spcPct val="20000"/>
+                  </a:spcBef>
+                  <a:buFont typeface="Arial"/>
+                  <a:buChar char="•"/>
+                  <a:defRPr sz="1500" kern="1200">
+                    <a:solidFill>
+                      <a:schemeClr val="tx1"/>
+                    </a:solidFill>
+                    <a:latin typeface="+mn-lt"/>
+                    <a:ea typeface="+mn-ea"/>
+                    <a:cs typeface="+mn-cs"/>
+                  </a:defRPr>
+                </a:lvl6pPr>
+                <a:lvl7pPr marL="2400300" indent="-342900" algn="l" defTabSz="342900" rtl="0" eaLnBrk="1" latinLnBrk="0" hangingPunct="1">
+                  <a:spcBef>
+                    <a:spcPct val="20000"/>
+                  </a:spcBef>
+                  <a:buFont typeface="Arial"/>
+                  <a:buChar char="•"/>
+                  <a:defRPr sz="1500" kern="1200">
+                    <a:solidFill>
+                      <a:schemeClr val="tx1"/>
+                    </a:solidFill>
+                    <a:latin typeface="+mn-lt"/>
+                    <a:ea typeface="+mn-ea"/>
+                    <a:cs typeface="+mn-cs"/>
+                  </a:defRPr>
+                </a:lvl7pPr>
+                <a:lvl8pPr marL="2743200" indent="-342900" algn="l" defTabSz="342900" rtl="0" eaLnBrk="1" latinLnBrk="0" hangingPunct="1">
+                  <a:spcBef>
+                    <a:spcPct val="20000"/>
+                  </a:spcBef>
+                  <a:buFont typeface="Arial"/>
+                  <a:buChar char="•"/>
+                  <a:defRPr sz="1500" kern="1200">
+                    <a:solidFill>
+                      <a:schemeClr val="tx1"/>
+                    </a:solidFill>
+                    <a:latin typeface="+mn-lt"/>
+                    <a:ea typeface="+mn-ea"/>
+                    <a:cs typeface="+mn-cs"/>
+                  </a:defRPr>
+                </a:lvl8pPr>
+                <a:lvl9pPr marL="3086100" indent="-342900" algn="l" defTabSz="342900" rtl="0" eaLnBrk="1" latinLnBrk="0" hangingPunct="1">
+                  <a:spcBef>
+                    <a:spcPct val="20000"/>
+                  </a:spcBef>
+                  <a:buFont typeface="Arial"/>
+                  <a:buChar char="•"/>
+                  <a:defRPr sz="1500" kern="1200">
+                    <a:solidFill>
+                      <a:schemeClr val="tx1"/>
+                    </a:solidFill>
+                    <a:latin typeface="+mn-lt"/>
+                    <a:ea typeface="+mn-ea"/>
+                    <a:cs typeface="+mn-cs"/>
+                  </a:defRPr>
+                </a:lvl9pPr>
+              </a:lstStyle>
+              <a:p>
+                <a:pPr marL="0" indent="0">
+                  <a:buFont typeface="Arial"/>
+                  <a:buNone/>
+                </a:pPr>
+                <a:r>
+                  <a:rPr lang="en-US" dirty="0"/>
+                  <a:t>Model with </a:t>
+                </a:r>
+                <a:r>
+                  <a:rPr lang="en-US" b="1" dirty="0"/>
+                  <a:t>only interaction terms</a:t>
+                </a:r>
+                <a:r>
+                  <a:rPr lang="en-US" dirty="0"/>
+                  <a:t> on the HSB2 data</a:t>
+                </a:r>
+              </a:p>
+              <a:p>
+                <a:pPr marL="0" indent="0">
+                  <a:buFont typeface="Arial"/>
+                  <a:buNone/>
+                </a:pPr>
+                <a14:m>
+                  <m:oMathPara xmlns:m="http://schemas.openxmlformats.org/officeDocument/2006/math">
+                    <m:oMathParaPr>
+                      <m:jc m:val="centerGroup"/>
+                    </m:oMathParaPr>
+                    <m:oMath xmlns:m="http://schemas.openxmlformats.org/officeDocument/2006/math">
+                      <m:r>
+                        <a:rPr lang="en-US" b="0" i="1" smtClean="0">
+                          <a:latin typeface="Cambria Math" panose="02040503050406030204" pitchFamily="18" charset="0"/>
+                        </a:rPr>
+                        <m:t>𝑠𝑜𝑐𝑠𝑡</m:t>
+                      </m:r>
+                      <m:r>
+                        <a:rPr lang="en-US" b="0" i="1" smtClean="0">
+                          <a:latin typeface="Cambria Math" panose="02040503050406030204" pitchFamily="18" charset="0"/>
+                          <a:ea typeface="Cambria Math" panose="02040503050406030204" pitchFamily="18" charset="0"/>
+                        </a:rPr>
+                        <m:t>~</m:t>
+                      </m:r>
+                      <m:r>
+                        <a:rPr lang="en-US" b="0" i="1" smtClean="0">
+                          <a:latin typeface="Cambria Math" panose="02040503050406030204" pitchFamily="18" charset="0"/>
+                          <a:ea typeface="Cambria Math" panose="02040503050406030204" pitchFamily="18" charset="0"/>
+                        </a:rPr>
+                        <m:t>𝐶</m:t>
+                      </m:r>
+                      <m:d>
+                        <m:dPr>
+                          <m:ctrlPr>
+                            <a:rPr lang="en-US" b="0" i="1" smtClean="0">
+                              <a:latin typeface="Cambria Math" panose="02040503050406030204" pitchFamily="18" charset="0"/>
+                              <a:ea typeface="Cambria Math" panose="02040503050406030204" pitchFamily="18" charset="0"/>
+                            </a:rPr>
+                          </m:ctrlPr>
+                        </m:dPr>
+                        <m:e>
+                          <m:r>
+                            <a:rPr lang="en-US" b="0" i="1" smtClean="0">
+                              <a:latin typeface="Cambria Math" panose="02040503050406030204" pitchFamily="18" charset="0"/>
+                              <a:ea typeface="Cambria Math" panose="02040503050406030204" pitchFamily="18" charset="0"/>
+                            </a:rPr>
+                            <m:t>𝑠𝑒𝑠</m:t>
+                          </m:r>
+                        </m:e>
+                      </m:d>
+                      <m:r>
+                        <a:rPr lang="en-US" b="0" i="1" smtClean="0">
+                          <a:latin typeface="Cambria Math" panose="02040503050406030204" pitchFamily="18" charset="0"/>
+                          <a:ea typeface="Cambria Math" panose="02040503050406030204" pitchFamily="18" charset="0"/>
+                        </a:rPr>
+                        <m:t>:</m:t>
+                      </m:r>
+                      <m:r>
+                        <a:rPr lang="en-US" b="0" i="1" smtClean="0">
+                          <a:latin typeface="Cambria Math" panose="02040503050406030204" pitchFamily="18" charset="0"/>
+                          <a:ea typeface="Cambria Math" panose="02040503050406030204" pitchFamily="18" charset="0"/>
+                        </a:rPr>
+                        <m:t>𝐶</m:t>
+                      </m:r>
+                      <m:d>
+                        <m:dPr>
+                          <m:ctrlPr>
+                            <a:rPr lang="en-US" b="0" i="1" smtClean="0">
+                              <a:latin typeface="Cambria Math" panose="02040503050406030204" pitchFamily="18" charset="0"/>
+                              <a:ea typeface="Cambria Math" panose="02040503050406030204" pitchFamily="18" charset="0"/>
+                            </a:rPr>
+                          </m:ctrlPr>
+                        </m:dPr>
+                        <m:e>
+                          <m:r>
+                            <a:rPr lang="en-US" b="0" i="1" smtClean="0">
+                              <a:latin typeface="Cambria Math" panose="02040503050406030204" pitchFamily="18" charset="0"/>
+                              <a:ea typeface="Cambria Math" panose="02040503050406030204" pitchFamily="18" charset="0"/>
+                            </a:rPr>
+                            <m:t>𝑝𝑟𝑜𝑔</m:t>
+                          </m:r>
+                        </m:e>
+                      </m:d>
+                    </m:oMath>
+                  </m:oMathPara>
+                </a14:m>
+                <a:endParaRPr lang="en-US" dirty="0"/>
+              </a:p>
+              <a:p>
+                <a:r>
+                  <a:rPr lang="en-US" sz="2000" dirty="0"/>
+                  <a:t>Note the </a:t>
+                </a:r>
+                <a14:m>
+                  <m:oMath xmlns:m="http://schemas.openxmlformats.org/officeDocument/2006/math">
+                    <m:sSubSup>
+                      <m:sSubSupPr>
+                        <m:ctrlPr>
+                          <a:rPr lang="en-US" sz="2000" i="1" smtClean="0">
+                            <a:latin typeface="Cambria Math" panose="02040503050406030204" pitchFamily="18" charset="0"/>
+                          </a:rPr>
+                        </m:ctrlPr>
+                      </m:sSubSupPr>
+                      <m:e>
+                        <m:r>
+                          <a:rPr lang="en-US" sz="2000" b="0" i="1" smtClean="0">
+                            <a:latin typeface="Cambria Math" panose="02040503050406030204" pitchFamily="18" charset="0"/>
+                          </a:rPr>
+                          <m:t>𝑅</m:t>
+                        </m:r>
+                      </m:e>
+                      <m:sub>
+                        <m:r>
+                          <a:rPr lang="en-US" sz="2000" b="0" i="1" smtClean="0">
+                            <a:latin typeface="Cambria Math" panose="02040503050406030204" pitchFamily="18" charset="0"/>
+                          </a:rPr>
+                          <m:t>𝑎𝑑𝑗</m:t>
+                        </m:r>
+                      </m:sub>
+                      <m:sup>
+                        <m:r>
+                          <a:rPr lang="en-US" sz="2000" b="0" i="1" smtClean="0">
+                            <a:latin typeface="Cambria Math" panose="02040503050406030204" pitchFamily="18" charset="0"/>
+                          </a:rPr>
+                          <m:t>2</m:t>
+                        </m:r>
+                      </m:sup>
+                    </m:sSubSup>
+                  </m:oMath>
+                </a14:m>
+                <a:r>
+                  <a:rPr lang="en-US" sz="2000" dirty="0"/>
+                  <a:t> and F-statistic are the same as the over-fit model </a:t>
+                </a:r>
+              </a:p>
+              <a:p>
+                <a:r>
+                  <a:rPr lang="en-US" sz="2000" dirty="0"/>
+                  <a:t>The model has only significant coeffects and is </a:t>
+                </a:r>
+                <a:r>
+                  <a:rPr lang="en-US" sz="2000" b="1" dirty="0"/>
+                  <a:t>not overfit </a:t>
+                </a:r>
+              </a:p>
+              <a:p>
+                <a:pPr lvl="1"/>
+                <a:r>
+                  <a:rPr lang="en-US" sz="1700" dirty="0"/>
+                  <a:t>All p-values show significance</a:t>
+                </a:r>
+              </a:p>
+              <a:p>
+                <a:pPr lvl="1"/>
+                <a:r>
+                  <a:rPr lang="en-US" sz="1700" dirty="0"/>
+                  <a:t>Standard error is smaller than magnitude of coefficient values  </a:t>
+                </a:r>
+                <a:endParaRPr lang="en-US" sz="1700" b="1" dirty="0"/>
+              </a:p>
+            </p:txBody>
+          </p:sp>
+        </mc:Choice>
+        <mc:Fallback>
+          <p:sp>
+            <p:nvSpPr>
+              <p:cNvPr id="8" name="Content Placeholder 2">
+                <a:extLst>
+                  <a:ext uri="{FF2B5EF4-FFF2-40B4-BE49-F238E27FC236}">
+                    <a16:creationId xmlns:a16="http://schemas.microsoft.com/office/drawing/2014/main" id="{D4816957-6B06-FDA1-772D-8065C15B6E43}"/>
+                  </a:ext>
+                </a:extLst>
+              </p:cNvPr>
+              <p:cNvSpPr txBox="1">
+                <a:spLocks noRot="1" noChangeAspect="1" noMove="1" noResize="1" noEditPoints="1" noAdjustHandles="1" noChangeArrowheads="1" noChangeShapeType="1" noTextEdit="1"/>
+              </p:cNvSpPr>
+              <p:nvPr/>
+            </p:nvSpPr>
+            <p:spPr>
+              <a:xfrm>
+                <a:off x="457200" y="1063228"/>
+                <a:ext cx="4050449" cy="3943619"/>
+              </a:xfrm>
+              <a:prstGeom prst="rect">
+                <a:avLst/>
+              </a:prstGeom>
+              <a:blipFill>
+                <a:blip r:embed="rId2"/>
+                <a:stretch>
+                  <a:fillRect l="-2259" t="-1236"/>
+                </a:stretch>
+              </a:blipFill>
+            </p:spPr>
+            <p:txBody>
+              <a:bodyPr/>
+              <a:lstStyle/>
+              <a:p>
+                <a:r>
+                  <a:rPr lang="en-US">
+                    <a:noFill/>
+                  </a:rPr>
+                  <a:t> </a:t>
+                </a:r>
+              </a:p>
+            </p:txBody>
+          </p:sp>
+        </mc:Fallback>
+      </mc:AlternateContent>
+      <p:pic>
+        <p:nvPicPr>
+          <p:cNvPr id="4" name="Picture 3">
+            <a:extLst>
+              <a:ext uri="{FF2B5EF4-FFF2-40B4-BE49-F238E27FC236}">
+                <a16:creationId xmlns:a16="http://schemas.microsoft.com/office/drawing/2014/main" id="{0A02462F-358A-7FA8-DE1C-FCB75FDC20B7}"/>
+              </a:ext>
+            </a:extLst>
+          </p:cNvPr>
+          <p:cNvPicPr>
+            <a:picLocks noChangeAspect="1"/>
+          </p:cNvPicPr>
+          <p:nvPr/>
+        </p:nvPicPr>
+        <p:blipFill>
+          <a:blip r:embed="rId3"/>
+          <a:stretch>
+            <a:fillRect/>
+          </a:stretch>
+        </p:blipFill>
+        <p:spPr>
+          <a:xfrm>
+            <a:off x="4543551" y="1442954"/>
+            <a:ext cx="4510109" cy="2840502"/>
+          </a:xfrm>
+          <a:prstGeom prst="rect">
+            <a:avLst/>
+          </a:prstGeom>
+        </p:spPr>
+      </p:pic>
+      <p:cxnSp>
+        <p:nvCxnSpPr>
+          <p:cNvPr id="5" name="Straight Arrow Connector 4">
+            <a:extLst>
+              <a:ext uri="{FF2B5EF4-FFF2-40B4-BE49-F238E27FC236}">
+                <a16:creationId xmlns:a16="http://schemas.microsoft.com/office/drawing/2014/main" id="{59FA4E4A-7922-D485-909B-74E81CD0E314}"/>
+              </a:ext>
+            </a:extLst>
+          </p:cNvPr>
+          <p:cNvCxnSpPr>
+            <a:cxnSpLocks/>
+          </p:cNvCxnSpPr>
+          <p:nvPr/>
+        </p:nvCxnSpPr>
+        <p:spPr>
+          <a:xfrm flipV="1">
+            <a:off x="4141216" y="1816608"/>
+            <a:ext cx="4035552" cy="784352"/>
+          </a:xfrm>
+          <a:prstGeom prst="straightConnector1">
+            <a:avLst/>
+          </a:prstGeom>
+          <a:ln>
+            <a:solidFill>
+              <a:schemeClr val="tx1"/>
+            </a:solidFill>
+            <a:tailEnd type="triangle"/>
+          </a:ln>
+        </p:spPr>
+        <p:style>
+          <a:lnRef idx="2">
+            <a:schemeClr val="accent1"/>
+          </a:lnRef>
+          <a:fillRef idx="0">
+            <a:schemeClr val="accent1"/>
+          </a:fillRef>
+          <a:effectRef idx="1">
+            <a:schemeClr val="accent1"/>
+          </a:effectRef>
+          <a:fontRef idx="minor">
+            <a:schemeClr val="tx1"/>
+          </a:fontRef>
+        </p:style>
+      </p:cxnSp>
+      <p:cxnSp>
+        <p:nvCxnSpPr>
+          <p:cNvPr id="6" name="Straight Arrow Connector 5">
+            <a:extLst>
+              <a:ext uri="{FF2B5EF4-FFF2-40B4-BE49-F238E27FC236}">
+                <a16:creationId xmlns:a16="http://schemas.microsoft.com/office/drawing/2014/main" id="{81D40B54-E6B0-7CB1-A9AD-D733C6D64577}"/>
+              </a:ext>
+            </a:extLst>
+          </p:cNvPr>
+          <p:cNvCxnSpPr>
+            <a:cxnSpLocks/>
+          </p:cNvCxnSpPr>
+          <p:nvPr/>
+        </p:nvCxnSpPr>
+        <p:spPr>
+          <a:xfrm flipV="1">
+            <a:off x="4072128" y="2698496"/>
+            <a:ext cx="2369312" cy="487680"/>
+          </a:xfrm>
+          <a:prstGeom prst="straightConnector1">
+            <a:avLst/>
+          </a:prstGeom>
+          <a:ln>
+            <a:solidFill>
+              <a:schemeClr val="tx1"/>
+            </a:solidFill>
+            <a:tailEnd type="triangle"/>
+          </a:ln>
+        </p:spPr>
+        <p:style>
+          <a:lnRef idx="2">
+            <a:schemeClr val="accent1"/>
+          </a:lnRef>
+          <a:fillRef idx="0">
+            <a:schemeClr val="accent1"/>
+          </a:fillRef>
+          <a:effectRef idx="1">
+            <a:schemeClr val="accent1"/>
+          </a:effectRef>
+          <a:fontRef idx="minor">
+            <a:schemeClr val="tx1"/>
+          </a:fontRef>
+        </p:style>
+      </p:cxnSp>
+      <p:cxnSp>
+        <p:nvCxnSpPr>
+          <p:cNvPr id="17" name="Straight Arrow Connector 16">
+            <a:extLst>
+              <a:ext uri="{FF2B5EF4-FFF2-40B4-BE49-F238E27FC236}">
+                <a16:creationId xmlns:a16="http://schemas.microsoft.com/office/drawing/2014/main" id="{DB66E8AC-680B-A880-80EC-D80721FBD33F}"/>
+              </a:ext>
+            </a:extLst>
+          </p:cNvPr>
+          <p:cNvCxnSpPr>
+            <a:cxnSpLocks/>
+          </p:cNvCxnSpPr>
+          <p:nvPr/>
+        </p:nvCxnSpPr>
+        <p:spPr>
+          <a:xfrm flipV="1">
+            <a:off x="4072128" y="2698496"/>
+            <a:ext cx="3527552" cy="487680"/>
+          </a:xfrm>
+          <a:prstGeom prst="straightConnector1">
+            <a:avLst/>
+          </a:prstGeom>
+          <a:ln>
+            <a:solidFill>
+              <a:schemeClr val="tx1"/>
+            </a:solidFill>
+            <a:tailEnd type="triangle"/>
+          </a:ln>
+        </p:spPr>
+        <p:style>
+          <a:lnRef idx="2">
+            <a:schemeClr val="accent1"/>
+          </a:lnRef>
+          <a:fillRef idx="0">
+            <a:schemeClr val="accent1"/>
+          </a:fillRef>
+          <a:effectRef idx="1">
+            <a:schemeClr val="accent1"/>
+          </a:effectRef>
+          <a:fontRef idx="minor">
+            <a:schemeClr val="tx1"/>
+          </a:fontRef>
+        </p:style>
+      </p:cxnSp>
     </p:spTree>
+    <p:extLst>
+      <p:ext uri="{BB962C8B-B14F-4D97-AF65-F5344CB8AC3E}">
+        <p14:creationId xmlns:p14="http://schemas.microsoft.com/office/powerpoint/2010/main" val="1680023130"/>
+      </p:ext>
+    </p:extLst>
   </p:cSld>
   <p:clrMapOvr>
     <a:masterClrMapping/>
@@ -16844,10 +17211,15 @@
             <p:ph idx="1"/>
           </p:nvPr>
         </p:nvSpPr>
-        <p:spPr/>
+        <p:spPr>
+          <a:xfrm>
+            <a:off x="457200" y="950976"/>
+            <a:ext cx="8229600" cy="4088384"/>
+          </a:xfrm>
+        </p:spPr>
         <p:txBody>
           <a:bodyPr>
-            <a:normAutofit fontScale="77500" lnSpcReduction="20000"/>
+            <a:normAutofit fontScale="85000" lnSpcReduction="20000"/>
           </a:bodyPr>
           <a:lstStyle/>
           <a:p>
@@ -16883,57 +17255,73 @@
           <a:p>
             <a:pPr lvl="1"/>
             <a:r>
+              <a:rPr lang="en-US" sz="2200" dirty="0"/>
+              <a:t>Some independent variables</a:t>
+            </a:r>
+            <a:r>
+              <a:rPr sz="2200" dirty="0"/>
+              <a:t> (features) are not needed</a:t>
+            </a:r>
+          </a:p>
+          <a:p>
+            <a:pPr lvl="1"/>
+            <a:r>
+              <a:rPr sz="2200" dirty="0"/>
+              <a:t>Including non-significant predictors can only </a:t>
+            </a:r>
+            <a:r>
+              <a:rPr sz="2200" b="1" dirty="0"/>
+              <a:t>increase noise </a:t>
+            </a:r>
+            <a:r>
+              <a:rPr sz="2200" dirty="0"/>
+              <a:t>and </a:t>
+            </a:r>
+            <a:r>
+              <a:rPr sz="2200" b="1" dirty="0"/>
+              <a:t>reduce generalization</a:t>
+            </a:r>
+          </a:p>
+          <a:p>
+            <a:pPr lvl="1"/>
+            <a:r>
+              <a:rPr sz="2200" b="1" dirty="0"/>
+              <a:t>Colinear features </a:t>
+            </a:r>
+            <a:r>
+              <a:rPr sz="2200" dirty="0"/>
+              <a:t>confound model fitting - coefficient values correlated</a:t>
+            </a:r>
+          </a:p>
+          <a:p>
+            <a:pPr lvl="1"/>
+            <a:r>
+              <a:rPr sz="2200" dirty="0"/>
+              <a:t>For model with linear response, consider the effect of an unexpected value of a non-significant predictor</a:t>
+            </a:r>
+          </a:p>
+          <a:p>
+            <a:pPr lvl="0"/>
+            <a:r>
+              <a:rPr lang="en-US" dirty="0"/>
+              <a:t>M</a:t>
+            </a:r>
+            <a:r>
               <a:rPr dirty="0"/>
-              <a:t>Several predictors (features) are included that are not needed</a:t>
+              <a:t>anually pruning a model with a great many features is a doomed task!</a:t>
             </a:r>
           </a:p>
           <a:p>
             <a:pPr lvl="1"/>
             <a:r>
-              <a:rPr dirty="0"/>
-              <a:t>Including non-significant predictors can only increase noise and reduce generalization of a model</a:t>
+              <a:rPr sz="2200" dirty="0"/>
+              <a:t>What if we included all the interactions with type of school, race and sex?</a:t>
             </a:r>
           </a:p>
           <a:p>
             <a:pPr lvl="1"/>
             <a:r>
-              <a:rPr dirty="0"/>
-              <a:t>Colinear features confound model </a:t>
-            </a:r>
-            <a:r>
-              <a:rPr dirty="0" err="1"/>
-              <a:t>fiting</a:t>
-            </a:r>
-            <a:r>
-              <a:rPr dirty="0"/>
-              <a:t> - change of coefficient values correlated</a:t>
-            </a:r>
-          </a:p>
-          <a:p>
-            <a:pPr lvl="1"/>
-            <a:r>
-              <a:rPr dirty="0"/>
-              <a:t>For model with linear response, consider the effect of an unexpected value of a non-significant predictor</a:t>
-            </a:r>
-          </a:p>
-          <a:p>
-            <a:pPr lvl="0"/>
-            <a:r>
-              <a:rPr dirty="0"/>
-              <a:t>But manually pruning a model with a great many features is a doomed task!</a:t>
-            </a:r>
-          </a:p>
-          <a:p>
-            <a:pPr lvl="1"/>
-            <a:r>
-              <a:rPr dirty="0"/>
-              <a:t>What if we included all the interactions with type of school, race and sex?</a:t>
-            </a:r>
-          </a:p>
-          <a:p>
-            <a:pPr lvl="1"/>
-            <a:r>
-              <a:rPr dirty="0"/>
+              <a:rPr sz="2200" dirty="0"/>
               <a:t>We now have up to 5th order interaction - 45 model coefficients with none significant!!</a:t>
             </a:r>
           </a:p>
@@ -16998,10 +17386,15 @@
             <p:ph idx="1"/>
           </p:nvPr>
         </p:nvSpPr>
-        <p:spPr/>
+        <p:spPr>
+          <a:xfrm>
+            <a:off x="457200" y="1200150"/>
+            <a:ext cx="8229600" cy="3591305"/>
+          </a:xfrm>
+        </p:spPr>
         <p:txBody>
           <a:bodyPr>
-            <a:normAutofit fontScale="85000" lnSpcReduction="10000"/>
+            <a:normAutofit fontScale="92500" lnSpcReduction="20000"/>
           </a:bodyPr>
           <a:lstStyle/>
           <a:p>
@@ -17009,63 +17402,94 @@
               <a:buNone/>
             </a:pPr>
             <a:r>
+              <a:rPr dirty="0"/>
               <a:t>We want our models to be </a:t>
             </a:r>
             <a:r>
-              <a:rPr b="1"/>
+              <a:rPr b="1" dirty="0"/>
               <a:t>sparse</a:t>
             </a:r>
           </a:p>
           <a:p>
             <a:pPr lvl="0"/>
             <a:r>
+              <a:rPr dirty="0"/>
               <a:t>A sparse model has the minimum complexity required to explain the data</a:t>
             </a:r>
           </a:p>
           <a:p>
             <a:pPr lvl="0"/>
             <a:r>
+              <a:rPr dirty="0"/>
               <a:t>The sparse model is a manifestation of </a:t>
             </a:r>
             <a:r>
-              <a:rPr b="1"/>
+              <a:rPr b="1" dirty="0"/>
               <a:t>Occam’s Razor</a:t>
             </a:r>
           </a:p>
           <a:p>
             <a:pPr lvl="1"/>
             <a:r>
-              <a:t>A scientific principle that the simplest of competing theories is the preferred one</a:t>
+              <a:rPr dirty="0"/>
+              <a:t>A scientific principle that the </a:t>
+            </a:r>
+            <a:r>
+              <a:rPr b="1" dirty="0"/>
+              <a:t>simplest of competing theories is the preferred one</a:t>
             </a:r>
           </a:p>
           <a:p>
             <a:pPr lvl="0"/>
             <a:r>
-              <a:t>Sparse models use the minimum number of independent variables (features)</a:t>
+              <a:rPr dirty="0"/>
+              <a:t>Sparse models use the </a:t>
+            </a:r>
+            <a:r>
+              <a:rPr b="1" dirty="0"/>
+              <a:t>minimum number of independent variables </a:t>
+            </a:r>
+            <a:r>
+              <a:rPr dirty="0"/>
+              <a:t>(features)</a:t>
             </a:r>
           </a:p>
           <a:p>
             <a:pPr lvl="1"/>
             <a:r>
+              <a:rPr dirty="0"/>
               <a:t>Are considered </a:t>
             </a:r>
             <a:r>
-              <a:rPr b="1"/>
-              <a:t>parsimonious</a:t>
-            </a:r>
-            <a:br/>
-            <a:endParaRPr/>
+              <a:rPr b="1" dirty="0"/>
+              <a:t>parsimoniou</a:t>
+            </a:r>
+            <a:r>
+              <a:rPr lang="en-US" b="1" dirty="0"/>
+              <a:t>s </a:t>
+            </a:r>
+            <a:endParaRPr dirty="0"/>
           </a:p>
           <a:p>
             <a:pPr lvl="1"/>
             <a:r>
+              <a:rPr dirty="0"/>
               <a:t>Generalize well</a:t>
             </a:r>
           </a:p>
           <a:p>
             <a:pPr lvl="0"/>
             <a:r>
-              <a:t>Use regularization methods to identify minimum coefficient set</a:t>
+              <a:rPr dirty="0"/>
+              <a:t>Use </a:t>
+            </a:r>
+            <a:r>
+              <a:rPr b="1" dirty="0"/>
+              <a:t>regularization methods </a:t>
+            </a:r>
+            <a:r>
+              <a:rPr dirty="0"/>
+              <a:t>to identify minimum coefficient set</a:t>
             </a:r>
           </a:p>
         </p:txBody>

</xml_diff>